<commit_message>
Endpräsentation und Doku erweitert
</commit_message>
<xml_diff>
--- a/Doku/endpräsentation-ehalth.pptx
+++ b/Doku/endpräsentation-ehalth.pptx
@@ -7,11 +7,23 @@
   <p:sldIdLst>
     <p:sldId id="256" r:id="rId2"/>
     <p:sldId id="257" r:id="rId3"/>
-    <p:sldId id="258" r:id="rId4"/>
-    <p:sldId id="259" r:id="rId5"/>
-    <p:sldId id="260" r:id="rId6"/>
+    <p:sldId id="275" r:id="rId4"/>
+    <p:sldId id="258" r:id="rId5"/>
+    <p:sldId id="259" r:id="rId6"/>
     <p:sldId id="261" r:id="rId7"/>
     <p:sldId id="262" r:id="rId8"/>
+    <p:sldId id="263" r:id="rId9"/>
+    <p:sldId id="264" r:id="rId10"/>
+    <p:sldId id="265" r:id="rId11"/>
+    <p:sldId id="266" r:id="rId12"/>
+    <p:sldId id="267" r:id="rId13"/>
+    <p:sldId id="268" r:id="rId14"/>
+    <p:sldId id="269" r:id="rId15"/>
+    <p:sldId id="272" r:id="rId16"/>
+    <p:sldId id="273" r:id="rId17"/>
+    <p:sldId id="274" r:id="rId18"/>
+    <p:sldId id="270" r:id="rId19"/>
+    <p:sldId id="276" r:id="rId20"/>
   </p:sldIdLst>
   <p:sldSz cx="9144000" cy="6858000" type="screen4x3"/>
   <p:notesSz cx="6858000" cy="9144000"/>
@@ -295,7 +307,7 @@
             <a:fld id="{B12B85DF-5738-486A-B015-0EB08E83C667}" type="datetimeFigureOut">
               <a:rPr lang="de-DE" smtClean="0"/>
               <a:pPr/>
-              <a:t>27.06.2019</a:t>
+              <a:t>29.06.2019</a:t>
             </a:fld>
             <a:endParaRPr lang="de-DE"/>
           </a:p>
@@ -462,7 +474,7 @@
             <a:fld id="{B12B85DF-5738-486A-B015-0EB08E83C667}" type="datetimeFigureOut">
               <a:rPr lang="de-DE" smtClean="0"/>
               <a:pPr/>
-              <a:t>27.06.2019</a:t>
+              <a:t>29.06.2019</a:t>
             </a:fld>
             <a:endParaRPr lang="de-DE"/>
           </a:p>
@@ -639,7 +651,7 @@
             <a:fld id="{B12B85DF-5738-486A-B015-0EB08E83C667}" type="datetimeFigureOut">
               <a:rPr lang="de-DE" smtClean="0"/>
               <a:pPr/>
-              <a:t>27.06.2019</a:t>
+              <a:t>29.06.2019</a:t>
             </a:fld>
             <a:endParaRPr lang="de-DE"/>
           </a:p>
@@ -806,7 +818,7 @@
             <a:fld id="{B12B85DF-5738-486A-B015-0EB08E83C667}" type="datetimeFigureOut">
               <a:rPr lang="de-DE" smtClean="0"/>
               <a:pPr/>
-              <a:t>27.06.2019</a:t>
+              <a:t>29.06.2019</a:t>
             </a:fld>
             <a:endParaRPr lang="de-DE"/>
           </a:p>
@@ -1049,7 +1061,7 @@
             <a:fld id="{B12B85DF-5738-486A-B015-0EB08E83C667}" type="datetimeFigureOut">
               <a:rPr lang="de-DE" smtClean="0"/>
               <a:pPr/>
-              <a:t>27.06.2019</a:t>
+              <a:t>29.06.2019</a:t>
             </a:fld>
             <a:endParaRPr lang="de-DE"/>
           </a:p>
@@ -1334,7 +1346,7 @@
             <a:fld id="{B12B85DF-5738-486A-B015-0EB08E83C667}" type="datetimeFigureOut">
               <a:rPr lang="de-DE" smtClean="0"/>
               <a:pPr/>
-              <a:t>27.06.2019</a:t>
+              <a:t>29.06.2019</a:t>
             </a:fld>
             <a:endParaRPr lang="de-DE"/>
           </a:p>
@@ -1753,7 +1765,7 @@
             <a:fld id="{B12B85DF-5738-486A-B015-0EB08E83C667}" type="datetimeFigureOut">
               <a:rPr lang="de-DE" smtClean="0"/>
               <a:pPr/>
-              <a:t>27.06.2019</a:t>
+              <a:t>29.06.2019</a:t>
             </a:fld>
             <a:endParaRPr lang="de-DE"/>
           </a:p>
@@ -1868,7 +1880,7 @@
             <a:fld id="{B12B85DF-5738-486A-B015-0EB08E83C667}" type="datetimeFigureOut">
               <a:rPr lang="de-DE" smtClean="0"/>
               <a:pPr/>
-              <a:t>27.06.2019</a:t>
+              <a:t>29.06.2019</a:t>
             </a:fld>
             <a:endParaRPr lang="de-DE"/>
           </a:p>
@@ -1960,7 +1972,7 @@
             <a:fld id="{B12B85DF-5738-486A-B015-0EB08E83C667}" type="datetimeFigureOut">
               <a:rPr lang="de-DE" smtClean="0"/>
               <a:pPr/>
-              <a:t>27.06.2019</a:t>
+              <a:t>29.06.2019</a:t>
             </a:fld>
             <a:endParaRPr lang="de-DE"/>
           </a:p>
@@ -2234,7 +2246,7 @@
             <a:fld id="{B12B85DF-5738-486A-B015-0EB08E83C667}" type="datetimeFigureOut">
               <a:rPr lang="de-DE" smtClean="0"/>
               <a:pPr/>
-              <a:t>27.06.2019</a:t>
+              <a:t>29.06.2019</a:t>
             </a:fld>
             <a:endParaRPr lang="de-DE"/>
           </a:p>
@@ -2484,7 +2496,7 @@
             <a:fld id="{B12B85DF-5738-486A-B015-0EB08E83C667}" type="datetimeFigureOut">
               <a:rPr lang="de-DE" smtClean="0"/>
               <a:pPr/>
-              <a:t>27.06.2019</a:t>
+              <a:t>29.06.2019</a:t>
             </a:fld>
             <a:endParaRPr lang="de-DE"/>
           </a:p>
@@ -2694,7 +2706,7 @@
             <a:fld id="{B12B85DF-5738-486A-B015-0EB08E83C667}" type="datetimeFigureOut">
               <a:rPr lang="de-DE" smtClean="0"/>
               <a:pPr/>
-              <a:t>27.06.2019</a:t>
+              <a:t>29.06.2019</a:t>
             </a:fld>
             <a:endParaRPr lang="de-DE"/>
           </a:p>
@@ -3148,7 +3160,7 @@
         </p:spPr>
         <p:txBody>
           <a:bodyPr vert="horz" lIns="91440" tIns="45720" rIns="91440" bIns="45720" rtlCol="0" anchor="ctr">
-            <a:normAutofit fontScale="97500"/>
+            <a:normAutofit fontScale="90000" lnSpcReduction="10000"/>
           </a:bodyPr>
           <a:lstStyle/>
           <a:p>
@@ -3185,6 +3197,39 @@
                 <a:cs typeface="+mj-cs"/>
               </a:rPr>
               <a:t>Endpräsentation</a:t>
+            </a:r>
+            <a:br>
+              <a:rPr kumimoji="0" lang="de-DE" sz="4600" b="1" i="0" u="none" strike="noStrike" kern="1200" cap="none" spc="0" normalizeH="0" baseline="0" noProof="0" dirty="0" smtClean="0">
+                <a:ln>
+                  <a:noFill/>
+                </a:ln>
+                <a:solidFill>
+                  <a:schemeClr val="bg1"/>
+                </a:solidFill>
+                <a:effectLst/>
+                <a:uLnTx/>
+                <a:uFillTx/>
+                <a:latin typeface="Kozuka Gothic Pro L" pitchFamily="34" charset="-128"/>
+                <a:ea typeface="Kozuka Gothic Pro L" pitchFamily="34" charset="-128"/>
+                <a:cs typeface="+mj-cs"/>
+              </a:rPr>
+            </a:br>
+            <a:r>
+              <a:rPr kumimoji="0" lang="de-DE" sz="4600" b="1" i="0" u="none" strike="noStrike" kern="1200" cap="none" spc="0" normalizeH="0" baseline="0" noProof="0" dirty="0" smtClean="0">
+                <a:ln>
+                  <a:noFill/>
+                </a:ln>
+                <a:solidFill>
+                  <a:schemeClr val="bg1"/>
+                </a:solidFill>
+                <a:effectLst/>
+                <a:uLnTx/>
+                <a:uFillTx/>
+                <a:latin typeface="Kozuka Gothic Pro L" pitchFamily="34" charset="-128"/>
+                <a:ea typeface="Kozuka Gothic Pro L" pitchFamily="34" charset="-128"/>
+                <a:cs typeface="+mj-cs"/>
+              </a:rPr>
+              <a:t>05.07.2019</a:t>
             </a:r>
             <a:endParaRPr kumimoji="0" lang="de-DE" sz="4600" b="1" i="0" u="none" strike="noStrike" kern="1200" cap="none" spc="0" normalizeH="0" baseline="0" noProof="0" dirty="0">
               <a:ln>
@@ -3280,6 +3325,1532 @@
               <a:ea typeface="+mn-ea"/>
               <a:cs typeface="+mn-cs"/>
             </a:endParaRPr>
+          </a:p>
+        </p:txBody>
+      </p:sp>
+    </p:spTree>
+  </p:cSld>
+  <p:clrMapOvr>
+    <a:masterClrMapping/>
+  </p:clrMapOvr>
+</p:sld>
+</file>
+
+<file path=ppt/slides/slide10.xml><?xml version="1.0" encoding="utf-8"?>
+<p:sld xmlns:a="http://schemas.openxmlformats.org/drawingml/2006/main" xmlns:r="http://schemas.openxmlformats.org/officeDocument/2006/relationships" xmlns:p="http://schemas.openxmlformats.org/presentationml/2006/main">
+  <p:cSld>
+    <p:spTree>
+      <p:nvGrpSpPr>
+        <p:cNvPr id="1" name=""/>
+        <p:cNvGrpSpPr/>
+        <p:nvPr/>
+      </p:nvGrpSpPr>
+      <p:grpSpPr>
+        <a:xfrm>
+          <a:off x="0" y="0"/>
+          <a:ext cx="0" cy="0"/>
+          <a:chOff x="0" y="0"/>
+          <a:chExt cx="0" cy="0"/>
+        </a:xfrm>
+      </p:grpSpPr>
+      <p:sp>
+        <p:nvSpPr>
+          <p:cNvPr id="2" name="Title 1"/>
+          <p:cNvSpPr>
+            <a:spLocks noGrp="1"/>
+          </p:cNvSpPr>
+          <p:nvPr>
+            <p:ph type="title"/>
+          </p:nvPr>
+        </p:nvSpPr>
+        <p:spPr/>
+        <p:txBody>
+          <a:bodyPr/>
+          <a:lstStyle/>
+          <a:p>
+            <a:r>
+              <a:rPr lang="de-DE" dirty="0" smtClean="0"/>
+              <a:t>Ergebnisse</a:t>
+            </a:r>
+            <a:endParaRPr lang="de-DE" dirty="0"/>
+          </a:p>
+        </p:txBody>
+      </p:sp>
+      <p:sp>
+        <p:nvSpPr>
+          <p:cNvPr id="5" name="TextBox 4"/>
+          <p:cNvSpPr txBox="1"/>
+          <p:nvPr/>
+        </p:nvSpPr>
+        <p:spPr>
+          <a:xfrm>
+            <a:off x="642910" y="4143380"/>
+            <a:ext cx="2602123" cy="369332"/>
+          </a:xfrm>
+          <a:prstGeom prst="rect">
+            <a:avLst/>
+          </a:prstGeom>
+          <a:noFill/>
+        </p:spPr>
+        <p:txBody>
+          <a:bodyPr wrap="none" rtlCol="0">
+            <a:spAutoFit/>
+          </a:bodyPr>
+          <a:lstStyle/>
+          <a:p>
+            <a:r>
+              <a:rPr lang="de-DE" dirty="0" smtClean="0"/>
+              <a:t>Mockup: Tagebuchmaske </a:t>
+            </a:r>
+            <a:endParaRPr lang="de-DE" dirty="0"/>
+          </a:p>
+        </p:txBody>
+      </p:sp>
+      <p:pic>
+        <p:nvPicPr>
+          <p:cNvPr id="4098" name="Picture 2" descr="D:\Documents\Dropbox\E-Health SS19\Bilder\Mockups\08_Tagebuch_ausfüllen.png"/>
+          <p:cNvPicPr>
+            <a:picLocks noChangeAspect="1" noChangeArrowheads="1"/>
+          </p:cNvPicPr>
+          <p:nvPr/>
+        </p:nvPicPr>
+        <p:blipFill>
+          <a:blip r:embed="rId2" cstate="print"/>
+          <a:srcRect/>
+          <a:stretch>
+            <a:fillRect/>
+          </a:stretch>
+        </p:blipFill>
+        <p:spPr bwMode="auto">
+          <a:xfrm>
+            <a:off x="142844" y="1214422"/>
+            <a:ext cx="3857652" cy="2897962"/>
+          </a:xfrm>
+          <a:prstGeom prst="rect">
+            <a:avLst/>
+          </a:prstGeom>
+          <a:noFill/>
+        </p:spPr>
+      </p:pic>
+      <p:pic>
+        <p:nvPicPr>
+          <p:cNvPr id="6" name="Picture 5" descr="tagebuch.PNG"/>
+          <p:cNvPicPr>
+            <a:picLocks noChangeAspect="1"/>
+          </p:cNvPicPr>
+          <p:nvPr/>
+        </p:nvPicPr>
+        <p:blipFill>
+          <a:blip r:embed="rId3" cstate="print"/>
+          <a:stretch>
+            <a:fillRect/>
+          </a:stretch>
+        </p:blipFill>
+        <p:spPr>
+          <a:xfrm>
+            <a:off x="2071670" y="4572008"/>
+            <a:ext cx="6957020" cy="2143140"/>
+          </a:xfrm>
+          <a:prstGeom prst="rect">
+            <a:avLst/>
+          </a:prstGeom>
+        </p:spPr>
+      </p:pic>
+      <p:sp>
+        <p:nvSpPr>
+          <p:cNvPr id="7" name="TextBox 6"/>
+          <p:cNvSpPr txBox="1"/>
+          <p:nvPr/>
+        </p:nvSpPr>
+        <p:spPr>
+          <a:xfrm>
+            <a:off x="4000496" y="6286520"/>
+            <a:ext cx="2241832" cy="369332"/>
+          </a:xfrm>
+          <a:prstGeom prst="rect">
+            <a:avLst/>
+          </a:prstGeom>
+          <a:noFill/>
+        </p:spPr>
+        <p:txBody>
+          <a:bodyPr wrap="none" rtlCol="0">
+            <a:spAutoFit/>
+          </a:bodyPr>
+          <a:lstStyle/>
+          <a:p>
+            <a:r>
+              <a:rPr lang="de-DE" dirty="0" smtClean="0"/>
+              <a:t>Umgesetztes </a:t>
+            </a:r>
+            <a:r>
+              <a:rPr lang="de-DE" dirty="0" smtClean="0"/>
+              <a:t>Ergebnis</a:t>
+            </a:r>
+            <a:endParaRPr lang="de-DE" dirty="0"/>
+          </a:p>
+        </p:txBody>
+      </p:sp>
+    </p:spTree>
+  </p:cSld>
+  <p:clrMapOvr>
+    <a:masterClrMapping/>
+  </p:clrMapOvr>
+</p:sld>
+</file>
+
+<file path=ppt/slides/slide11.xml><?xml version="1.0" encoding="utf-8"?>
+<p:sld xmlns:a="http://schemas.openxmlformats.org/drawingml/2006/main" xmlns:r="http://schemas.openxmlformats.org/officeDocument/2006/relationships" xmlns:p="http://schemas.openxmlformats.org/presentationml/2006/main">
+  <p:cSld>
+    <p:spTree>
+      <p:nvGrpSpPr>
+        <p:cNvPr id="1" name=""/>
+        <p:cNvGrpSpPr/>
+        <p:nvPr/>
+      </p:nvGrpSpPr>
+      <p:grpSpPr>
+        <a:xfrm>
+          <a:off x="0" y="0"/>
+          <a:ext cx="0" cy="0"/>
+          <a:chOff x="0" y="0"/>
+          <a:chExt cx="0" cy="0"/>
+        </a:xfrm>
+      </p:grpSpPr>
+      <p:sp>
+        <p:nvSpPr>
+          <p:cNvPr id="2" name="Title 1"/>
+          <p:cNvSpPr>
+            <a:spLocks noGrp="1"/>
+          </p:cNvSpPr>
+          <p:nvPr>
+            <p:ph type="title"/>
+          </p:nvPr>
+        </p:nvSpPr>
+        <p:spPr/>
+        <p:txBody>
+          <a:bodyPr/>
+          <a:lstStyle/>
+          <a:p>
+            <a:r>
+              <a:rPr lang="de-DE" dirty="0" smtClean="0"/>
+              <a:t>Ergebnisse</a:t>
+            </a:r>
+            <a:endParaRPr lang="de-DE" dirty="0"/>
+          </a:p>
+        </p:txBody>
+      </p:sp>
+      <p:sp>
+        <p:nvSpPr>
+          <p:cNvPr id="5" name="TextBox 4"/>
+          <p:cNvSpPr txBox="1"/>
+          <p:nvPr/>
+        </p:nvSpPr>
+        <p:spPr>
+          <a:xfrm>
+            <a:off x="1428728" y="4643446"/>
+            <a:ext cx="3201004" cy="369332"/>
+          </a:xfrm>
+          <a:prstGeom prst="rect">
+            <a:avLst/>
+          </a:prstGeom>
+          <a:noFill/>
+        </p:spPr>
+        <p:txBody>
+          <a:bodyPr wrap="none" rtlCol="0">
+            <a:spAutoFit/>
+          </a:bodyPr>
+          <a:lstStyle/>
+          <a:p>
+            <a:r>
+              <a:rPr lang="de-DE" dirty="0" smtClean="0"/>
+              <a:t>Mockup: Ausgefülltes Tagebuch </a:t>
+            </a:r>
+            <a:endParaRPr lang="de-DE" dirty="0"/>
+          </a:p>
+        </p:txBody>
+      </p:sp>
+      <p:pic>
+        <p:nvPicPr>
+          <p:cNvPr id="5122" name="Picture 2" descr="D:\Documents\Dropbox\E-Health SS19\Bilder\Mockups\09_ausgefülltes_Tagebuch.png"/>
+          <p:cNvPicPr>
+            <a:picLocks noChangeAspect="1" noChangeArrowheads="1"/>
+          </p:cNvPicPr>
+          <p:nvPr/>
+        </p:nvPicPr>
+        <p:blipFill>
+          <a:blip r:embed="rId2" cstate="print"/>
+          <a:srcRect/>
+          <a:stretch>
+            <a:fillRect/>
+          </a:stretch>
+        </p:blipFill>
+        <p:spPr bwMode="auto">
+          <a:xfrm>
+            <a:off x="1071537" y="1928802"/>
+            <a:ext cx="3603073" cy="2714644"/>
+          </a:xfrm>
+          <a:prstGeom prst="rect">
+            <a:avLst/>
+          </a:prstGeom>
+          <a:noFill/>
+        </p:spPr>
+      </p:pic>
+    </p:spTree>
+  </p:cSld>
+  <p:clrMapOvr>
+    <a:masterClrMapping/>
+  </p:clrMapOvr>
+</p:sld>
+</file>
+
+<file path=ppt/slides/slide12.xml><?xml version="1.0" encoding="utf-8"?>
+<p:sld xmlns:a="http://schemas.openxmlformats.org/drawingml/2006/main" xmlns:r="http://schemas.openxmlformats.org/officeDocument/2006/relationships" xmlns:p="http://schemas.openxmlformats.org/presentationml/2006/main">
+  <p:cSld>
+    <p:spTree>
+      <p:nvGrpSpPr>
+        <p:cNvPr id="1" name=""/>
+        <p:cNvGrpSpPr/>
+        <p:nvPr/>
+      </p:nvGrpSpPr>
+      <p:grpSpPr>
+        <a:xfrm>
+          <a:off x="0" y="0"/>
+          <a:ext cx="0" cy="0"/>
+          <a:chOff x="0" y="0"/>
+          <a:chExt cx="0" cy="0"/>
+        </a:xfrm>
+      </p:grpSpPr>
+      <p:sp>
+        <p:nvSpPr>
+          <p:cNvPr id="2" name="Title 1"/>
+          <p:cNvSpPr>
+            <a:spLocks noGrp="1"/>
+          </p:cNvSpPr>
+          <p:nvPr>
+            <p:ph type="title"/>
+          </p:nvPr>
+        </p:nvSpPr>
+        <p:spPr/>
+        <p:txBody>
+          <a:bodyPr/>
+          <a:lstStyle/>
+          <a:p>
+            <a:r>
+              <a:rPr lang="de-DE" dirty="0" smtClean="0"/>
+              <a:t>Ergebnisse</a:t>
+            </a:r>
+            <a:endParaRPr lang="de-DE" dirty="0"/>
+          </a:p>
+        </p:txBody>
+      </p:sp>
+      <p:sp>
+        <p:nvSpPr>
+          <p:cNvPr id="5" name="TextBox 4"/>
+          <p:cNvSpPr txBox="1"/>
+          <p:nvPr/>
+        </p:nvSpPr>
+        <p:spPr>
+          <a:xfrm>
+            <a:off x="1428728" y="4643446"/>
+            <a:ext cx="2390654" cy="369332"/>
+          </a:xfrm>
+          <a:prstGeom prst="rect">
+            <a:avLst/>
+          </a:prstGeom>
+          <a:noFill/>
+        </p:spPr>
+        <p:txBody>
+          <a:bodyPr wrap="none" rtlCol="0">
+            <a:spAutoFit/>
+          </a:bodyPr>
+          <a:lstStyle/>
+          <a:p>
+            <a:r>
+              <a:rPr lang="de-DE" dirty="0" smtClean="0"/>
+              <a:t>Mockup: Rückmeldung </a:t>
+            </a:r>
+            <a:endParaRPr lang="de-DE" dirty="0"/>
+          </a:p>
+        </p:txBody>
+      </p:sp>
+      <p:pic>
+        <p:nvPicPr>
+          <p:cNvPr id="6146" name="Picture 2" descr="D:\Documents\Dropbox\E-Health SS19\Bilder\Mockups\10_speichern_ändern.png"/>
+          <p:cNvPicPr>
+            <a:picLocks noChangeAspect="1" noChangeArrowheads="1"/>
+          </p:cNvPicPr>
+          <p:nvPr/>
+        </p:nvPicPr>
+        <p:blipFill>
+          <a:blip r:embed="rId2" cstate="print"/>
+          <a:srcRect/>
+          <a:stretch>
+            <a:fillRect/>
+          </a:stretch>
+        </p:blipFill>
+        <p:spPr bwMode="auto">
+          <a:xfrm>
+            <a:off x="857224" y="2000240"/>
+            <a:ext cx="3617165" cy="2714644"/>
+          </a:xfrm>
+          <a:prstGeom prst="rect">
+            <a:avLst/>
+          </a:prstGeom>
+          <a:noFill/>
+        </p:spPr>
+      </p:pic>
+    </p:spTree>
+  </p:cSld>
+  <p:clrMapOvr>
+    <a:masterClrMapping/>
+  </p:clrMapOvr>
+</p:sld>
+</file>
+
+<file path=ppt/slides/slide13.xml><?xml version="1.0" encoding="utf-8"?>
+<p:sld xmlns:a="http://schemas.openxmlformats.org/drawingml/2006/main" xmlns:r="http://schemas.openxmlformats.org/officeDocument/2006/relationships" xmlns:p="http://schemas.openxmlformats.org/presentationml/2006/main">
+  <p:cSld>
+    <p:spTree>
+      <p:nvGrpSpPr>
+        <p:cNvPr id="1" name=""/>
+        <p:cNvGrpSpPr/>
+        <p:nvPr/>
+      </p:nvGrpSpPr>
+      <p:grpSpPr>
+        <a:xfrm>
+          <a:off x="0" y="0"/>
+          <a:ext cx="0" cy="0"/>
+          <a:chOff x="0" y="0"/>
+          <a:chExt cx="0" cy="0"/>
+        </a:xfrm>
+      </p:grpSpPr>
+      <p:sp>
+        <p:nvSpPr>
+          <p:cNvPr id="2" name="Title 1"/>
+          <p:cNvSpPr>
+            <a:spLocks noGrp="1"/>
+          </p:cNvSpPr>
+          <p:nvPr>
+            <p:ph type="title"/>
+          </p:nvPr>
+        </p:nvSpPr>
+        <p:spPr/>
+        <p:txBody>
+          <a:bodyPr/>
+          <a:lstStyle/>
+          <a:p>
+            <a:r>
+              <a:rPr lang="de-DE" dirty="0" smtClean="0"/>
+              <a:t>Ergebnisse</a:t>
+            </a:r>
+            <a:endParaRPr lang="de-DE" dirty="0"/>
+          </a:p>
+        </p:txBody>
+      </p:sp>
+      <p:sp>
+        <p:nvSpPr>
+          <p:cNvPr id="5" name="TextBox 4"/>
+          <p:cNvSpPr txBox="1"/>
+          <p:nvPr/>
+        </p:nvSpPr>
+        <p:spPr>
+          <a:xfrm>
+            <a:off x="4000496" y="1357298"/>
+            <a:ext cx="2089483" cy="369332"/>
+          </a:xfrm>
+          <a:prstGeom prst="rect">
+            <a:avLst/>
+          </a:prstGeom>
+          <a:noFill/>
+        </p:spPr>
+        <p:txBody>
+          <a:bodyPr wrap="none" rtlCol="0">
+            <a:spAutoFit/>
+          </a:bodyPr>
+          <a:lstStyle/>
+          <a:p>
+            <a:r>
+              <a:rPr lang="de-DE" dirty="0" smtClean="0"/>
+              <a:t>Mockup: Ausloggen </a:t>
+            </a:r>
+            <a:endParaRPr lang="de-DE" dirty="0"/>
+          </a:p>
+        </p:txBody>
+      </p:sp>
+      <p:pic>
+        <p:nvPicPr>
+          <p:cNvPr id="7170" name="Picture 2" descr="D:\Documents\Dropbox\E-Health SS19\Bilder\Mockups\11_ausgeloggt_seite.png"/>
+          <p:cNvPicPr>
+            <a:picLocks noChangeAspect="1" noChangeArrowheads="1"/>
+          </p:cNvPicPr>
+          <p:nvPr/>
+        </p:nvPicPr>
+        <p:blipFill>
+          <a:blip r:embed="rId2" cstate="print"/>
+          <a:srcRect/>
+          <a:stretch>
+            <a:fillRect/>
+          </a:stretch>
+        </p:blipFill>
+        <p:spPr bwMode="auto">
+          <a:xfrm>
+            <a:off x="214282" y="1357298"/>
+            <a:ext cx="3786214" cy="2851760"/>
+          </a:xfrm>
+          <a:prstGeom prst="rect">
+            <a:avLst/>
+          </a:prstGeom>
+          <a:noFill/>
+        </p:spPr>
+      </p:pic>
+      <p:pic>
+        <p:nvPicPr>
+          <p:cNvPr id="6" name="Picture 5" descr="auslog.PNG"/>
+          <p:cNvPicPr>
+            <a:picLocks noChangeAspect="1"/>
+          </p:cNvPicPr>
+          <p:nvPr/>
+        </p:nvPicPr>
+        <p:blipFill>
+          <a:blip r:embed="rId3" cstate="print"/>
+          <a:stretch>
+            <a:fillRect/>
+          </a:stretch>
+        </p:blipFill>
+        <p:spPr>
+          <a:xfrm>
+            <a:off x="3643306" y="4143378"/>
+            <a:ext cx="5507100" cy="2714646"/>
+          </a:xfrm>
+          <a:prstGeom prst="rect">
+            <a:avLst/>
+          </a:prstGeom>
+        </p:spPr>
+      </p:pic>
+      <p:sp>
+        <p:nvSpPr>
+          <p:cNvPr id="7" name="TextBox 6"/>
+          <p:cNvSpPr txBox="1"/>
+          <p:nvPr/>
+        </p:nvSpPr>
+        <p:spPr>
+          <a:xfrm>
+            <a:off x="571472" y="6357958"/>
+            <a:ext cx="2241832" cy="369332"/>
+          </a:xfrm>
+          <a:prstGeom prst="rect">
+            <a:avLst/>
+          </a:prstGeom>
+          <a:noFill/>
+        </p:spPr>
+        <p:txBody>
+          <a:bodyPr wrap="none" rtlCol="0">
+            <a:spAutoFit/>
+          </a:bodyPr>
+          <a:lstStyle/>
+          <a:p>
+            <a:r>
+              <a:rPr lang="de-DE" dirty="0" smtClean="0"/>
+              <a:t>Umgesetztes </a:t>
+            </a:r>
+            <a:r>
+              <a:rPr lang="de-DE" dirty="0" smtClean="0"/>
+              <a:t>Ergebnis</a:t>
+            </a:r>
+            <a:endParaRPr lang="de-DE" dirty="0"/>
+          </a:p>
+        </p:txBody>
+      </p:sp>
+    </p:spTree>
+  </p:cSld>
+  <p:clrMapOvr>
+    <a:masterClrMapping/>
+  </p:clrMapOvr>
+</p:sld>
+</file>
+
+<file path=ppt/slides/slide14.xml><?xml version="1.0" encoding="utf-8"?>
+<p:sld xmlns:a="http://schemas.openxmlformats.org/drawingml/2006/main" xmlns:r="http://schemas.openxmlformats.org/officeDocument/2006/relationships" xmlns:p="http://schemas.openxmlformats.org/presentationml/2006/main">
+  <p:cSld>
+    <p:spTree>
+      <p:nvGrpSpPr>
+        <p:cNvPr id="1" name=""/>
+        <p:cNvGrpSpPr/>
+        <p:nvPr/>
+      </p:nvGrpSpPr>
+      <p:grpSpPr>
+        <a:xfrm>
+          <a:off x="0" y="0"/>
+          <a:ext cx="0" cy="0"/>
+          <a:chOff x="0" y="0"/>
+          <a:chExt cx="0" cy="0"/>
+        </a:xfrm>
+      </p:grpSpPr>
+      <p:sp>
+        <p:nvSpPr>
+          <p:cNvPr id="2" name="Title 1"/>
+          <p:cNvSpPr>
+            <a:spLocks noGrp="1"/>
+          </p:cNvSpPr>
+          <p:nvPr>
+            <p:ph type="title"/>
+          </p:nvPr>
+        </p:nvSpPr>
+        <p:spPr/>
+        <p:txBody>
+          <a:bodyPr/>
+          <a:lstStyle/>
+          <a:p>
+            <a:r>
+              <a:rPr lang="de-DE" dirty="0" smtClean="0"/>
+              <a:t>Use Case</a:t>
+            </a:r>
+            <a:endParaRPr lang="de-DE" dirty="0"/>
+          </a:p>
+        </p:txBody>
+      </p:sp>
+      <p:pic>
+        <p:nvPicPr>
+          <p:cNvPr id="8194" name="Picture 2" descr="D:\Documents\Dropbox\E-Health SS19\Bilder\use_case.jpg"/>
+          <p:cNvPicPr>
+            <a:picLocks noChangeAspect="1" noChangeArrowheads="1"/>
+          </p:cNvPicPr>
+          <p:nvPr/>
+        </p:nvPicPr>
+        <p:blipFill>
+          <a:blip r:embed="rId2" cstate="print"/>
+          <a:srcRect/>
+          <a:stretch>
+            <a:fillRect/>
+          </a:stretch>
+        </p:blipFill>
+        <p:spPr bwMode="auto">
+          <a:xfrm>
+            <a:off x="2285984" y="1357298"/>
+            <a:ext cx="4786346" cy="4786346"/>
+          </a:xfrm>
+          <a:prstGeom prst="rect">
+            <a:avLst/>
+          </a:prstGeom>
+          <a:noFill/>
+        </p:spPr>
+      </p:pic>
+    </p:spTree>
+  </p:cSld>
+  <p:clrMapOvr>
+    <a:masterClrMapping/>
+  </p:clrMapOvr>
+</p:sld>
+</file>
+
+<file path=ppt/slides/slide15.xml><?xml version="1.0" encoding="utf-8"?>
+<p:sld xmlns:a="http://schemas.openxmlformats.org/drawingml/2006/main" xmlns:r="http://schemas.openxmlformats.org/officeDocument/2006/relationships" xmlns:p="http://schemas.openxmlformats.org/presentationml/2006/main">
+  <p:cSld>
+    <p:spTree>
+      <p:nvGrpSpPr>
+        <p:cNvPr id="1" name=""/>
+        <p:cNvGrpSpPr/>
+        <p:nvPr/>
+      </p:nvGrpSpPr>
+      <p:grpSpPr>
+        <a:xfrm>
+          <a:off x="0" y="0"/>
+          <a:ext cx="0" cy="0"/>
+          <a:chOff x="0" y="0"/>
+          <a:chExt cx="0" cy="0"/>
+        </a:xfrm>
+      </p:grpSpPr>
+      <p:sp>
+        <p:nvSpPr>
+          <p:cNvPr id="2" name="Title 1"/>
+          <p:cNvSpPr>
+            <a:spLocks noGrp="1"/>
+          </p:cNvSpPr>
+          <p:nvPr>
+            <p:ph type="title"/>
+          </p:nvPr>
+        </p:nvSpPr>
+        <p:spPr/>
+        <p:txBody>
+          <a:bodyPr>
+            <a:normAutofit fontScale="90000"/>
+          </a:bodyPr>
+          <a:lstStyle/>
+          <a:p>
+            <a:r>
+              <a:rPr lang="de-DE" dirty="0" smtClean="0"/>
+              <a:t>„Wie wurden die Use Cases getestet?“</a:t>
+            </a:r>
+            <a:endParaRPr lang="de-DE" dirty="0"/>
+          </a:p>
+        </p:txBody>
+      </p:sp>
+      <p:sp>
+        <p:nvSpPr>
+          <p:cNvPr id="3" name="Content Placeholder 2"/>
+          <p:cNvSpPr>
+            <a:spLocks noGrp="1"/>
+          </p:cNvSpPr>
+          <p:nvPr>
+            <p:ph idx="1"/>
+          </p:nvPr>
+        </p:nvSpPr>
+        <p:spPr/>
+        <p:txBody>
+          <a:bodyPr/>
+          <a:lstStyle/>
+          <a:p>
+            <a:pPr marL="514350" indent="-514350">
+              <a:buNone/>
+            </a:pPr>
+            <a:r>
+              <a:rPr lang="de-DE" dirty="0" smtClean="0"/>
+              <a:t>Es wurde ein </a:t>
+            </a:r>
+            <a:r>
+              <a:rPr lang="de-DE" b="1" dirty="0" smtClean="0"/>
+              <a:t>Click dummy </a:t>
+            </a:r>
+            <a:r>
+              <a:rPr lang="de-DE" dirty="0" smtClean="0"/>
+              <a:t>(Prototyp was </a:t>
+            </a:r>
+          </a:p>
+          <a:p>
+            <a:pPr marL="514350" indent="-514350">
+              <a:buNone/>
+            </a:pPr>
+            <a:r>
+              <a:rPr lang="de-DE" dirty="0" smtClean="0"/>
+              <a:t>simuliert werden kann) erzeugt.</a:t>
+            </a:r>
+          </a:p>
+          <a:p>
+            <a:pPr marL="514350" indent="-514350">
+              <a:buNone/>
+            </a:pPr>
+            <a:r>
+              <a:rPr lang="de-DE" dirty="0" smtClean="0">
+                <a:sym typeface="Wingdings" pitchFamily="2" charset="2"/>
+              </a:rPr>
+              <a:t> Mit der Software „JustInMind“</a:t>
+            </a:r>
+            <a:endParaRPr lang="de-DE" dirty="0" smtClean="0"/>
+          </a:p>
+        </p:txBody>
+      </p:sp>
+    </p:spTree>
+  </p:cSld>
+  <p:clrMapOvr>
+    <a:masterClrMapping/>
+  </p:clrMapOvr>
+</p:sld>
+</file>
+
+<file path=ppt/slides/slide16.xml><?xml version="1.0" encoding="utf-8"?>
+<p:sld xmlns:a="http://schemas.openxmlformats.org/drawingml/2006/main" xmlns:r="http://schemas.openxmlformats.org/officeDocument/2006/relationships" xmlns:p="http://schemas.openxmlformats.org/presentationml/2006/main">
+  <p:cSld>
+    <p:spTree>
+      <p:nvGrpSpPr>
+        <p:cNvPr id="1" name=""/>
+        <p:cNvGrpSpPr/>
+        <p:nvPr/>
+      </p:nvGrpSpPr>
+      <p:grpSpPr>
+        <a:xfrm>
+          <a:off x="0" y="0"/>
+          <a:ext cx="0" cy="0"/>
+          <a:chOff x="0" y="0"/>
+          <a:chExt cx="0" cy="0"/>
+        </a:xfrm>
+      </p:grpSpPr>
+      <p:sp>
+        <p:nvSpPr>
+          <p:cNvPr id="2" name="Title 1"/>
+          <p:cNvSpPr>
+            <a:spLocks noGrp="1"/>
+          </p:cNvSpPr>
+          <p:nvPr>
+            <p:ph type="title"/>
+          </p:nvPr>
+        </p:nvSpPr>
+        <p:spPr/>
+        <p:txBody>
+          <a:bodyPr>
+            <a:normAutofit fontScale="90000"/>
+          </a:bodyPr>
+          <a:lstStyle/>
+          <a:p>
+            <a:r>
+              <a:rPr lang="de-DE" dirty="0" smtClean="0"/>
+              <a:t>„Wie wurden die Use Cases getestet?“</a:t>
+            </a:r>
+            <a:endParaRPr lang="de-DE" dirty="0"/>
+          </a:p>
+        </p:txBody>
+      </p:sp>
+      <p:sp>
+        <p:nvSpPr>
+          <p:cNvPr id="3" name="Content Placeholder 2"/>
+          <p:cNvSpPr>
+            <a:spLocks noGrp="1"/>
+          </p:cNvSpPr>
+          <p:nvPr>
+            <p:ph idx="1"/>
+          </p:nvPr>
+        </p:nvSpPr>
+        <p:spPr>
+          <a:xfrm>
+            <a:off x="457200" y="1314448"/>
+            <a:ext cx="8229600" cy="614354"/>
+          </a:xfrm>
+        </p:spPr>
+        <p:txBody>
+          <a:bodyPr/>
+          <a:lstStyle/>
+          <a:p>
+            <a:pPr marL="514350" indent="-514350">
+              <a:buNone/>
+            </a:pPr>
+            <a:r>
+              <a:rPr lang="de-DE" dirty="0" smtClean="0"/>
+              <a:t>Es wurden </a:t>
+            </a:r>
+            <a:r>
+              <a:rPr lang="de-DE" b="1" dirty="0" smtClean="0"/>
+              <a:t>Personas</a:t>
+            </a:r>
+            <a:r>
+              <a:rPr lang="de-DE" dirty="0" smtClean="0"/>
+              <a:t> erstellt:</a:t>
+            </a:r>
+          </a:p>
+          <a:p>
+            <a:pPr marL="514350" indent="-514350">
+              <a:buNone/>
+            </a:pPr>
+            <a:endParaRPr lang="de-DE" dirty="0" smtClean="0"/>
+          </a:p>
+        </p:txBody>
+      </p:sp>
+      <p:pic>
+        <p:nvPicPr>
+          <p:cNvPr id="4" name="Picture 3" descr="helmut.PNG"/>
+          <p:cNvPicPr>
+            <a:picLocks noChangeAspect="1"/>
+          </p:cNvPicPr>
+          <p:nvPr/>
+        </p:nvPicPr>
+        <p:blipFill>
+          <a:blip r:embed="rId2" cstate="print"/>
+          <a:stretch>
+            <a:fillRect/>
+          </a:stretch>
+        </p:blipFill>
+        <p:spPr>
+          <a:xfrm>
+            <a:off x="0" y="2285992"/>
+            <a:ext cx="4643470" cy="4071212"/>
+          </a:xfrm>
+          <a:prstGeom prst="rect">
+            <a:avLst/>
+          </a:prstGeom>
+        </p:spPr>
+      </p:pic>
+      <p:pic>
+        <p:nvPicPr>
+          <p:cNvPr id="5" name="Picture 4" descr="kim.PNG"/>
+          <p:cNvPicPr>
+            <a:picLocks noChangeAspect="1"/>
+          </p:cNvPicPr>
+          <p:nvPr/>
+        </p:nvPicPr>
+        <p:blipFill>
+          <a:blip r:embed="rId3" cstate="print"/>
+          <a:stretch>
+            <a:fillRect/>
+          </a:stretch>
+        </p:blipFill>
+        <p:spPr>
+          <a:xfrm>
+            <a:off x="4643438" y="2353992"/>
+            <a:ext cx="4429124" cy="4003966"/>
+          </a:xfrm>
+          <a:prstGeom prst="rect">
+            <a:avLst/>
+          </a:prstGeom>
+        </p:spPr>
+      </p:pic>
+      <p:sp>
+        <p:nvSpPr>
+          <p:cNvPr id="6" name="Rectangle 5"/>
+          <p:cNvSpPr/>
+          <p:nvPr/>
+        </p:nvSpPr>
+        <p:spPr>
+          <a:xfrm>
+            <a:off x="214282" y="2285992"/>
+            <a:ext cx="4429156" cy="4214842"/>
+          </a:xfrm>
+          <a:prstGeom prst="rect">
+            <a:avLst/>
+          </a:prstGeom>
+          <a:noFill/>
+          <a:ln>
+            <a:solidFill>
+              <a:srgbClr val="00B050"/>
+            </a:solidFill>
+          </a:ln>
+        </p:spPr>
+        <p:style>
+          <a:lnRef idx="2">
+            <a:schemeClr val="accent1">
+              <a:shade val="50000"/>
+            </a:schemeClr>
+          </a:lnRef>
+          <a:fillRef idx="1">
+            <a:schemeClr val="accent1"/>
+          </a:fillRef>
+          <a:effectRef idx="0">
+            <a:schemeClr val="accent1"/>
+          </a:effectRef>
+          <a:fontRef idx="minor">
+            <a:schemeClr val="lt1"/>
+          </a:fontRef>
+        </p:style>
+        <p:txBody>
+          <a:bodyPr rtlCol="0" anchor="ctr"/>
+          <a:lstStyle/>
+          <a:p>
+            <a:pPr algn="ctr"/>
+            <a:endParaRPr lang="de-DE"/>
+          </a:p>
+        </p:txBody>
+      </p:sp>
+      <p:sp>
+        <p:nvSpPr>
+          <p:cNvPr id="7" name="Rectangle 6"/>
+          <p:cNvSpPr/>
+          <p:nvPr/>
+        </p:nvSpPr>
+        <p:spPr>
+          <a:xfrm>
+            <a:off x="4714876" y="2285992"/>
+            <a:ext cx="4357718" cy="4214842"/>
+          </a:xfrm>
+          <a:prstGeom prst="rect">
+            <a:avLst/>
+          </a:prstGeom>
+          <a:noFill/>
+          <a:ln>
+            <a:solidFill>
+              <a:srgbClr val="9B159E"/>
+            </a:solidFill>
+          </a:ln>
+        </p:spPr>
+        <p:style>
+          <a:lnRef idx="2">
+            <a:schemeClr val="accent1">
+              <a:shade val="50000"/>
+            </a:schemeClr>
+          </a:lnRef>
+          <a:fillRef idx="1">
+            <a:schemeClr val="accent1"/>
+          </a:fillRef>
+          <a:effectRef idx="0">
+            <a:schemeClr val="accent1"/>
+          </a:effectRef>
+          <a:fontRef idx="minor">
+            <a:schemeClr val="lt1"/>
+          </a:fontRef>
+        </p:style>
+        <p:txBody>
+          <a:bodyPr rtlCol="0" anchor="ctr"/>
+          <a:lstStyle/>
+          <a:p>
+            <a:pPr algn="ctr"/>
+            <a:endParaRPr lang="de-DE"/>
+          </a:p>
+        </p:txBody>
+      </p:sp>
+    </p:spTree>
+  </p:cSld>
+  <p:clrMapOvr>
+    <a:masterClrMapping/>
+  </p:clrMapOvr>
+</p:sld>
+</file>
+
+<file path=ppt/slides/slide17.xml><?xml version="1.0" encoding="utf-8"?>
+<p:sld xmlns:a="http://schemas.openxmlformats.org/drawingml/2006/main" xmlns:r="http://schemas.openxmlformats.org/officeDocument/2006/relationships" xmlns:p="http://schemas.openxmlformats.org/presentationml/2006/main">
+  <p:cSld>
+    <p:spTree>
+      <p:nvGrpSpPr>
+        <p:cNvPr id="1" name=""/>
+        <p:cNvGrpSpPr/>
+        <p:nvPr/>
+      </p:nvGrpSpPr>
+      <p:grpSpPr>
+        <a:xfrm>
+          <a:off x="0" y="0"/>
+          <a:ext cx="0" cy="0"/>
+          <a:chOff x="0" y="0"/>
+          <a:chExt cx="0" cy="0"/>
+        </a:xfrm>
+      </p:grpSpPr>
+      <p:sp>
+        <p:nvSpPr>
+          <p:cNvPr id="2" name="Title 1"/>
+          <p:cNvSpPr>
+            <a:spLocks noGrp="1"/>
+          </p:cNvSpPr>
+          <p:nvPr>
+            <p:ph type="title"/>
+          </p:nvPr>
+        </p:nvSpPr>
+        <p:spPr/>
+        <p:txBody>
+          <a:bodyPr>
+            <a:normAutofit fontScale="90000"/>
+          </a:bodyPr>
+          <a:lstStyle/>
+          <a:p>
+            <a:r>
+              <a:rPr lang="de-DE" dirty="0" smtClean="0"/>
+              <a:t>„Wie wurden die Use Cases getestet?“</a:t>
+            </a:r>
+            <a:endParaRPr lang="de-DE" dirty="0"/>
+          </a:p>
+        </p:txBody>
+      </p:sp>
+      <p:sp>
+        <p:nvSpPr>
+          <p:cNvPr id="3" name="Content Placeholder 2"/>
+          <p:cNvSpPr>
+            <a:spLocks noGrp="1"/>
+          </p:cNvSpPr>
+          <p:nvPr>
+            <p:ph idx="1"/>
+          </p:nvPr>
+        </p:nvSpPr>
+        <p:spPr>
+          <a:xfrm>
+            <a:off x="457200" y="1314448"/>
+            <a:ext cx="8229600" cy="614354"/>
+          </a:xfrm>
+        </p:spPr>
+        <p:txBody>
+          <a:bodyPr/>
+          <a:lstStyle/>
+          <a:p>
+            <a:pPr marL="514350" indent="-514350">
+              <a:buNone/>
+            </a:pPr>
+            <a:r>
+              <a:rPr lang="de-DE" dirty="0" smtClean="0"/>
+              <a:t>Es wurden Personas erstellt:</a:t>
+            </a:r>
+          </a:p>
+          <a:p>
+            <a:pPr marL="514350" indent="-514350">
+              <a:buNone/>
+            </a:pPr>
+            <a:endParaRPr lang="de-DE" dirty="0" smtClean="0"/>
+          </a:p>
+        </p:txBody>
+      </p:sp>
+      <p:pic>
+        <p:nvPicPr>
+          <p:cNvPr id="8" name="Picture 7" descr="annika.PNG"/>
+          <p:cNvPicPr>
+            <a:picLocks noChangeAspect="1"/>
+          </p:cNvPicPr>
+          <p:nvPr/>
+        </p:nvPicPr>
+        <p:blipFill>
+          <a:blip r:embed="rId2" cstate="print"/>
+          <a:stretch>
+            <a:fillRect/>
+          </a:stretch>
+        </p:blipFill>
+        <p:spPr>
+          <a:xfrm>
+            <a:off x="2285984" y="2000216"/>
+            <a:ext cx="4605731" cy="4714932"/>
+          </a:xfrm>
+          <a:prstGeom prst="rect">
+            <a:avLst/>
+          </a:prstGeom>
+        </p:spPr>
+      </p:pic>
+      <p:sp>
+        <p:nvSpPr>
+          <p:cNvPr id="6" name="Rectangle 5"/>
+          <p:cNvSpPr/>
+          <p:nvPr/>
+        </p:nvSpPr>
+        <p:spPr>
+          <a:xfrm>
+            <a:off x="2428860" y="1928802"/>
+            <a:ext cx="4500594" cy="4857784"/>
+          </a:xfrm>
+          <a:prstGeom prst="rect">
+            <a:avLst/>
+          </a:prstGeom>
+          <a:noFill/>
+          <a:ln>
+            <a:solidFill>
+              <a:schemeClr val="accent5">
+                <a:lumMod val="75000"/>
+              </a:schemeClr>
+            </a:solidFill>
+          </a:ln>
+        </p:spPr>
+        <p:style>
+          <a:lnRef idx="2">
+            <a:schemeClr val="accent1">
+              <a:shade val="50000"/>
+            </a:schemeClr>
+          </a:lnRef>
+          <a:fillRef idx="1">
+            <a:schemeClr val="accent1"/>
+          </a:fillRef>
+          <a:effectRef idx="0">
+            <a:schemeClr val="accent1"/>
+          </a:effectRef>
+          <a:fontRef idx="minor">
+            <a:schemeClr val="lt1"/>
+          </a:fontRef>
+        </p:style>
+        <p:txBody>
+          <a:bodyPr rtlCol="0" anchor="ctr"/>
+          <a:lstStyle/>
+          <a:p>
+            <a:pPr algn="ctr"/>
+            <a:endParaRPr lang="de-DE"/>
+          </a:p>
+        </p:txBody>
+      </p:sp>
+    </p:spTree>
+  </p:cSld>
+  <p:clrMapOvr>
+    <a:masterClrMapping/>
+  </p:clrMapOvr>
+</p:sld>
+</file>
+
+<file path=ppt/slides/slide18.xml><?xml version="1.0" encoding="utf-8"?>
+<p:sld xmlns:a="http://schemas.openxmlformats.org/drawingml/2006/main" xmlns:r="http://schemas.openxmlformats.org/officeDocument/2006/relationships" xmlns:p="http://schemas.openxmlformats.org/presentationml/2006/main">
+  <p:cSld>
+    <p:spTree>
+      <p:nvGrpSpPr>
+        <p:cNvPr id="1" name=""/>
+        <p:cNvGrpSpPr/>
+        <p:nvPr/>
+      </p:nvGrpSpPr>
+      <p:grpSpPr>
+        <a:xfrm>
+          <a:off x="0" y="0"/>
+          <a:ext cx="0" cy="0"/>
+          <a:chOff x="0" y="0"/>
+          <a:chExt cx="0" cy="0"/>
+        </a:xfrm>
+      </p:grpSpPr>
+      <p:sp>
+        <p:nvSpPr>
+          <p:cNvPr id="2" name="Title 1"/>
+          <p:cNvSpPr>
+            <a:spLocks noGrp="1"/>
+          </p:cNvSpPr>
+          <p:nvPr>
+            <p:ph type="title"/>
+          </p:nvPr>
+        </p:nvSpPr>
+        <p:spPr/>
+        <p:txBody>
+          <a:bodyPr/>
+          <a:lstStyle/>
+          <a:p>
+            <a:r>
+              <a:rPr lang="de-DE" dirty="0" smtClean="0"/>
+              <a:t>Risiken</a:t>
+            </a:r>
+            <a:endParaRPr lang="de-DE" dirty="0"/>
+          </a:p>
+        </p:txBody>
+      </p:sp>
+      <p:sp>
+        <p:nvSpPr>
+          <p:cNvPr id="4" name="Content Placeholder 2"/>
+          <p:cNvSpPr txBox="1">
+            <a:spLocks/>
+          </p:cNvSpPr>
+          <p:nvPr/>
+        </p:nvSpPr>
+        <p:spPr>
+          <a:xfrm>
+            <a:off x="285720" y="2214554"/>
+            <a:ext cx="8643998" cy="2257428"/>
+          </a:xfrm>
+          <a:prstGeom prst="rect">
+            <a:avLst/>
+          </a:prstGeom>
+        </p:spPr>
+        <p:txBody>
+          <a:bodyPr vert="horz" lIns="91440" tIns="45720" rIns="91440" bIns="45720" rtlCol="0">
+            <a:normAutofit/>
+          </a:bodyPr>
+          <a:lstStyle/>
+          <a:p>
+            <a:pPr marL="342900" marR="0" lvl="0" indent="-342900" algn="l" defTabSz="914400" rtl="0" eaLnBrk="1" fontAlgn="auto" latinLnBrk="0" hangingPunct="1">
+              <a:lnSpc>
+                <a:spcPct val="100000"/>
+              </a:lnSpc>
+              <a:spcBef>
+                <a:spcPct val="20000"/>
+              </a:spcBef>
+              <a:spcAft>
+                <a:spcPts val="0"/>
+              </a:spcAft>
+              <a:buClrTx/>
+              <a:buSzTx/>
+              <a:buFont typeface="Arial" pitchFamily="34" charset="0"/>
+              <a:buNone/>
+              <a:tabLst/>
+              <a:defRPr/>
+            </a:pPr>
+            <a:r>
+              <a:rPr kumimoji="0" lang="de-DE" sz="3200" b="1" i="0" u="none" strike="noStrike" kern="1200" cap="none" spc="0" normalizeH="0" baseline="0" noProof="0" dirty="0" smtClean="0">
+                <a:ln>
+                  <a:noFill/>
+                </a:ln>
+                <a:solidFill>
+                  <a:srgbClr val="C00000"/>
+                </a:solidFill>
+                <a:effectLst/>
+                <a:uLnTx/>
+                <a:uFillTx/>
+                <a:latin typeface="Kozuka Gothic Pro L" pitchFamily="34" charset="-128"/>
+                <a:ea typeface="Kozuka Gothic Pro L" pitchFamily="34" charset="-128"/>
+                <a:cs typeface="+mn-cs"/>
+              </a:rPr>
+              <a:t>Risiko #4 </a:t>
+            </a:r>
+            <a:r>
+              <a:rPr kumimoji="0" lang="de-DE" sz="3200" b="0" i="0" u="none" strike="noStrike" kern="1200" cap="none" spc="0" normalizeH="0" baseline="0" noProof="0" dirty="0" smtClean="0">
+                <a:ln>
+                  <a:noFill/>
+                </a:ln>
+                <a:solidFill>
+                  <a:schemeClr val="tx1"/>
+                </a:solidFill>
+                <a:effectLst/>
+                <a:uLnTx/>
+                <a:uFillTx/>
+                <a:latin typeface="Kozuka Gothic Pro L" pitchFamily="34" charset="-128"/>
+                <a:ea typeface="Kozuka Gothic Pro L" pitchFamily="34" charset="-128"/>
+                <a:cs typeface="+mn-cs"/>
+              </a:rPr>
+              <a:t>ist aufgetreten:</a:t>
+            </a:r>
+          </a:p>
+          <a:p>
+            <a:pPr marL="342900" marR="0" lvl="0" indent="-342900" algn="l" defTabSz="914400" rtl="0" eaLnBrk="1" fontAlgn="auto" latinLnBrk="0" hangingPunct="1">
+              <a:lnSpc>
+                <a:spcPct val="100000"/>
+              </a:lnSpc>
+              <a:spcBef>
+                <a:spcPct val="20000"/>
+              </a:spcBef>
+              <a:spcAft>
+                <a:spcPts val="0"/>
+              </a:spcAft>
+              <a:buClrTx/>
+              <a:buSzTx/>
+              <a:buFont typeface="Arial" pitchFamily="34" charset="0"/>
+              <a:buNone/>
+              <a:tabLst/>
+              <a:defRPr/>
+            </a:pPr>
+            <a:r>
+              <a:rPr kumimoji="0" lang="de-DE" sz="3200" b="0" i="0" u="none" strike="noStrike" kern="1200" cap="none" spc="0" normalizeH="0" baseline="0" noProof="0" dirty="0" smtClean="0">
+                <a:ln>
+                  <a:noFill/>
+                </a:ln>
+                <a:solidFill>
+                  <a:schemeClr val="tx1"/>
+                </a:solidFill>
+                <a:effectLst/>
+                <a:uLnTx/>
+                <a:uFillTx/>
+                <a:latin typeface="Kozuka Gothic Pro L" pitchFamily="34" charset="-128"/>
+                <a:ea typeface="Kozuka Gothic Pro L" pitchFamily="34" charset="-128"/>
+                <a:cs typeface="+mn-cs"/>
+              </a:rPr>
+              <a:t>       </a:t>
+            </a:r>
+            <a:r>
+              <a:rPr kumimoji="0" lang="de-DE" sz="3200" b="1" i="0" u="none" strike="noStrike" kern="1200" cap="none" spc="0" normalizeH="0" baseline="0" noProof="0" dirty="0" smtClean="0">
+                <a:ln>
+                  <a:noFill/>
+                </a:ln>
+                <a:solidFill>
+                  <a:schemeClr val="tx1"/>
+                </a:solidFill>
+                <a:effectLst/>
+                <a:uLnTx/>
+                <a:uFillTx/>
+                <a:latin typeface="Kozuka Gothic Pro L" pitchFamily="34" charset="-128"/>
+                <a:ea typeface="Kozuka Gothic Pro L" pitchFamily="34" charset="-128"/>
+                <a:cs typeface="+mn-cs"/>
+              </a:rPr>
+              <a:t>falsche Zeitplanung</a:t>
+            </a:r>
+          </a:p>
+          <a:p>
+            <a:pPr marL="342900" marR="0" lvl="0" indent="-342900" algn="l" defTabSz="914400" rtl="0" eaLnBrk="1" fontAlgn="auto" latinLnBrk="0" hangingPunct="1">
+              <a:lnSpc>
+                <a:spcPct val="100000"/>
+              </a:lnSpc>
+              <a:spcBef>
+                <a:spcPct val="20000"/>
+              </a:spcBef>
+              <a:spcAft>
+                <a:spcPts val="0"/>
+              </a:spcAft>
+              <a:buClrTx/>
+              <a:buSzTx/>
+              <a:buFont typeface="Arial" pitchFamily="34" charset="0"/>
+              <a:buNone/>
+              <a:tabLst/>
+              <a:defRPr/>
+            </a:pPr>
+            <a:r>
+              <a:rPr kumimoji="0" lang="de-DE" sz="3200" b="0" i="0" u="none" strike="noStrike" kern="1200" cap="none" spc="0" normalizeH="0" baseline="0" noProof="0" dirty="0" smtClean="0">
+                <a:ln>
+                  <a:noFill/>
+                </a:ln>
+                <a:solidFill>
+                  <a:schemeClr val="tx1"/>
+                </a:solidFill>
+                <a:effectLst/>
+                <a:uLnTx/>
+                <a:uFillTx/>
+                <a:latin typeface="Kozuka Gothic Pro L" pitchFamily="34" charset="-128"/>
+                <a:ea typeface="Kozuka Gothic Pro L" pitchFamily="34" charset="-128"/>
+                <a:cs typeface="+mn-cs"/>
+              </a:rPr>
+              <a:t>Wahrscheinlichkeit des Auftretens: </a:t>
+            </a:r>
+            <a:r>
+              <a:rPr kumimoji="0" lang="de-DE" sz="3200" b="1" i="0" u="none" strike="noStrike" kern="1200" cap="none" spc="0" normalizeH="0" baseline="0" noProof="0" dirty="0" smtClean="0">
+                <a:ln>
+                  <a:noFill/>
+                </a:ln>
+                <a:solidFill>
+                  <a:schemeClr val="tx1"/>
+                </a:solidFill>
+                <a:effectLst/>
+                <a:uLnTx/>
+                <a:uFillTx/>
+                <a:latin typeface="Kozuka Gothic Pro L" pitchFamily="34" charset="-128"/>
+                <a:ea typeface="Kozuka Gothic Pro L" pitchFamily="34" charset="-128"/>
+                <a:cs typeface="+mn-cs"/>
+              </a:rPr>
+              <a:t>50%</a:t>
+            </a:r>
+            <a:endParaRPr kumimoji="0" lang="de-DE" sz="3200" b="1" i="0" u="none" strike="noStrike" kern="1200" cap="none" spc="0" normalizeH="0" baseline="0" noProof="0" dirty="0">
+              <a:ln>
+                <a:noFill/>
+              </a:ln>
+              <a:solidFill>
+                <a:schemeClr val="tx1"/>
+              </a:solidFill>
+              <a:effectLst/>
+              <a:uLnTx/>
+              <a:uFillTx/>
+              <a:latin typeface="Kozuka Gothic Pro L" pitchFamily="34" charset="-128"/>
+              <a:ea typeface="Kozuka Gothic Pro L" pitchFamily="34" charset="-128"/>
+              <a:cs typeface="+mn-cs"/>
+            </a:endParaRPr>
+          </a:p>
+        </p:txBody>
+      </p:sp>
+      <p:sp>
+        <p:nvSpPr>
+          <p:cNvPr id="5" name="Right Arrow 4"/>
+          <p:cNvSpPr/>
+          <p:nvPr/>
+        </p:nvSpPr>
+        <p:spPr>
+          <a:xfrm>
+            <a:off x="285720" y="2857496"/>
+            <a:ext cx="642942" cy="436169"/>
+          </a:xfrm>
+          <a:prstGeom prst="rightArrow">
+            <a:avLst/>
+          </a:prstGeom>
+          <a:noFill/>
+          <a:ln w="38100">
+            <a:solidFill>
+              <a:srgbClr val="075E45"/>
+            </a:solidFill>
+          </a:ln>
+        </p:spPr>
+        <p:style>
+          <a:lnRef idx="2">
+            <a:schemeClr val="accent1">
+              <a:shade val="50000"/>
+            </a:schemeClr>
+          </a:lnRef>
+          <a:fillRef idx="1">
+            <a:schemeClr val="accent1"/>
+          </a:fillRef>
+          <a:effectRef idx="0">
+            <a:schemeClr val="accent1"/>
+          </a:effectRef>
+          <a:fontRef idx="minor">
+            <a:schemeClr val="lt1"/>
+          </a:fontRef>
+        </p:style>
+        <p:txBody>
+          <a:bodyPr rtlCol="0" anchor="ctr"/>
+          <a:lstStyle/>
+          <a:p>
+            <a:pPr algn="ctr"/>
+            <a:endParaRPr lang="de-DE"/>
+          </a:p>
+        </p:txBody>
+      </p:sp>
+    </p:spTree>
+  </p:cSld>
+  <p:clrMapOvr>
+    <a:masterClrMapping/>
+  </p:clrMapOvr>
+</p:sld>
+</file>
+
+<file path=ppt/slides/slide19.xml><?xml version="1.0" encoding="utf-8"?>
+<p:sld xmlns:a="http://schemas.openxmlformats.org/drawingml/2006/main" xmlns:r="http://schemas.openxmlformats.org/officeDocument/2006/relationships" xmlns:p="http://schemas.openxmlformats.org/presentationml/2006/main">
+  <p:cSld>
+    <p:spTree>
+      <p:nvGrpSpPr>
+        <p:cNvPr id="1" name=""/>
+        <p:cNvGrpSpPr/>
+        <p:nvPr/>
+      </p:nvGrpSpPr>
+      <p:grpSpPr>
+        <a:xfrm>
+          <a:off x="0" y="0"/>
+          <a:ext cx="0" cy="0"/>
+          <a:chOff x="0" y="0"/>
+          <a:chExt cx="0" cy="0"/>
+        </a:xfrm>
+      </p:grpSpPr>
+      <p:sp>
+        <p:nvSpPr>
+          <p:cNvPr id="2" name="Title 1"/>
+          <p:cNvSpPr>
+            <a:spLocks noGrp="1"/>
+          </p:cNvSpPr>
+          <p:nvPr>
+            <p:ph type="title"/>
+          </p:nvPr>
+        </p:nvSpPr>
+        <p:spPr/>
+        <p:txBody>
+          <a:bodyPr/>
+          <a:lstStyle/>
+          <a:p>
+            <a:r>
+              <a:rPr lang="de-DE" dirty="0" smtClean="0"/>
+              <a:t>Abweichungen</a:t>
+            </a:r>
+            <a:endParaRPr lang="de-DE" dirty="0"/>
+          </a:p>
+        </p:txBody>
+      </p:sp>
+      <p:sp>
+        <p:nvSpPr>
+          <p:cNvPr id="3" name="Content Placeholder 2"/>
+          <p:cNvSpPr>
+            <a:spLocks noGrp="1"/>
+          </p:cNvSpPr>
+          <p:nvPr>
+            <p:ph idx="1"/>
+          </p:nvPr>
+        </p:nvSpPr>
+        <p:spPr/>
+        <p:txBody>
+          <a:bodyPr/>
+          <a:lstStyle/>
+          <a:p>
+            <a:pPr marL="514350" indent="-514350">
+              <a:buFont typeface="+mj-lt"/>
+              <a:buAutoNum type="arabicPeriod"/>
+            </a:pPr>
+            <a:r>
+              <a:rPr lang="de-DE" dirty="0" smtClean="0"/>
+              <a:t>Startseite Psychologe – es werden nur </a:t>
+            </a:r>
+            <a:r>
+              <a:rPr lang="de-DE" b="1" dirty="0" smtClean="0"/>
+              <a:t>aktuelle Notizen angezeigt</a:t>
+            </a:r>
+            <a:r>
+              <a:rPr lang="de-DE" dirty="0" smtClean="0"/>
+              <a:t>, </a:t>
+            </a:r>
+            <a:r>
+              <a:rPr lang="de-DE" b="1" dirty="0" smtClean="0"/>
+              <a:t>keine</a:t>
+            </a:r>
+            <a:r>
+              <a:rPr lang="de-DE" dirty="0" smtClean="0"/>
+              <a:t> </a:t>
+            </a:r>
+            <a:r>
+              <a:rPr lang="de-DE" b="1" dirty="0" smtClean="0"/>
+              <a:t>Tagebucheinträge</a:t>
+            </a:r>
+            <a:r>
+              <a:rPr lang="de-DE" dirty="0" smtClean="0"/>
+              <a:t> und </a:t>
+            </a:r>
+            <a:r>
+              <a:rPr lang="de-DE" b="1" dirty="0" smtClean="0"/>
+              <a:t>Medikamenteneinnahme</a:t>
+            </a:r>
+            <a:r>
+              <a:rPr lang="de-DE" dirty="0" smtClean="0"/>
+              <a:t>.</a:t>
+            </a:r>
+          </a:p>
+          <a:p>
+            <a:pPr marL="514350" indent="-514350">
+              <a:buFont typeface="+mj-lt"/>
+              <a:buAutoNum type="arabicPeriod"/>
+            </a:pPr>
+            <a:r>
+              <a:rPr lang="de-DE" dirty="0" smtClean="0"/>
+              <a:t>Im Tagebuch wird </a:t>
+            </a:r>
+            <a:r>
+              <a:rPr lang="de-DE" b="1" dirty="0" smtClean="0"/>
+              <a:t>kein Datum </a:t>
+            </a:r>
+            <a:r>
+              <a:rPr lang="de-DE" dirty="0" smtClean="0"/>
+              <a:t>und </a:t>
+            </a:r>
+            <a:r>
+              <a:rPr lang="de-DE" b="1" dirty="0" smtClean="0"/>
+              <a:t>keine aktuelle Uhrzeit</a:t>
+            </a:r>
+            <a:r>
+              <a:rPr lang="de-DE" dirty="0" smtClean="0"/>
+              <a:t> angezeigt.</a:t>
+            </a:r>
+            <a:endParaRPr lang="de-DE" dirty="0"/>
           </a:p>
         </p:txBody>
       </p:sp>
@@ -3331,47 +4902,162 @@
           </a:p>
         </p:txBody>
       </p:sp>
-      <p:sp>
-        <p:nvSpPr>
-          <p:cNvPr id="3" name="Content Placeholder 2"/>
-          <p:cNvSpPr>
-            <a:spLocks noGrp="1"/>
-          </p:cNvSpPr>
-          <p:nvPr>
-            <p:ph idx="1"/>
-          </p:nvPr>
-        </p:nvSpPr>
-        <p:spPr/>
-        <p:txBody>
-          <a:bodyPr/>
-          <a:lstStyle/>
-          <a:p>
-            <a:r>
-              <a:rPr lang="de-DE" dirty="0" smtClean="0"/>
-              <a:t>Projektidee</a:t>
-            </a:r>
-          </a:p>
-          <a:p>
-            <a:r>
-              <a:rPr lang="de-DE" dirty="0" smtClean="0"/>
-              <a:t>Use Case</a:t>
-            </a:r>
-          </a:p>
-          <a:p>
-            <a:r>
-              <a:rPr lang="de-DE" dirty="0" smtClean="0"/>
-              <a:t>Was wurde realisiert?</a:t>
-            </a:r>
-          </a:p>
-          <a:p>
-            <a:r>
-              <a:rPr lang="de-DE" dirty="0" smtClean="0"/>
-              <a:t>Risiken</a:t>
-            </a:r>
-            <a:endParaRPr lang="de-DE" dirty="0"/>
-          </a:p>
-        </p:txBody>
-      </p:sp>
+      <p:graphicFrame>
+        <p:nvGraphicFramePr>
+          <p:cNvPr id="4" name="Table 3"/>
+          <p:cNvGraphicFramePr>
+            <a:graphicFrameLocks noGrp="1"/>
+          </p:cNvGraphicFramePr>
+          <p:nvPr/>
+        </p:nvGraphicFramePr>
+        <p:xfrm>
+          <a:off x="857224" y="2428868"/>
+          <a:ext cx="6096000" cy="1854200"/>
+        </p:xfrm>
+        <a:graphic>
+          <a:graphicData uri="http://schemas.openxmlformats.org/drawingml/2006/table">
+            <a:tbl>
+              <a:tblPr firstRow="1" bandRow="1">
+                <a:tableStyleId>{3B4B98B0-60AC-42C2-AFA5-B58CD77FA1E5}</a:tableStyleId>
+              </a:tblPr>
+              <a:tblGrid>
+                <a:gridCol w="3048000"/>
+                <a:gridCol w="3048000"/>
+              </a:tblGrid>
+              <a:tr h="370840">
+                <a:tc>
+                  <a:txBody>
+                    <a:bodyPr/>
+                    <a:lstStyle/>
+                    <a:p>
+                      <a:r>
+                        <a:rPr lang="de-DE" b="0" dirty="0" smtClean="0"/>
+                        <a:t>Projektidee</a:t>
+                      </a:r>
+                      <a:endParaRPr lang="de-DE" b="0" dirty="0"/>
+                    </a:p>
+                  </a:txBody>
+                  <a:tcPr/>
+                </a:tc>
+                <a:tc>
+                  <a:txBody>
+                    <a:bodyPr/>
+                    <a:lstStyle/>
+                    <a:p>
+                      <a:endParaRPr lang="de-DE" b="0" dirty="0"/>
+                    </a:p>
+                  </a:txBody>
+                  <a:tcPr/>
+                </a:tc>
+              </a:tr>
+              <a:tr h="370840">
+                <a:tc>
+                  <a:txBody>
+                    <a:bodyPr/>
+                    <a:lstStyle/>
+                    <a:p>
+                      <a:r>
+                        <a:rPr lang="de-DE" dirty="0" smtClean="0"/>
+                        <a:t>Ergebnisse</a:t>
+                      </a:r>
+                      <a:endParaRPr lang="de-DE" dirty="0"/>
+                    </a:p>
+                  </a:txBody>
+                  <a:tcPr/>
+                </a:tc>
+                <a:tc>
+                  <a:txBody>
+                    <a:bodyPr/>
+                    <a:lstStyle/>
+                    <a:p>
+                      <a:endParaRPr lang="de-DE" dirty="0"/>
+                    </a:p>
+                  </a:txBody>
+                  <a:tcPr/>
+                </a:tc>
+              </a:tr>
+              <a:tr h="370840">
+                <a:tc>
+                  <a:txBody>
+                    <a:bodyPr/>
+                    <a:lstStyle/>
+                    <a:p>
+                      <a:r>
+                        <a:rPr lang="de-DE" dirty="0" smtClean="0"/>
+                        <a:t>Use Cases</a:t>
+                      </a:r>
+                      <a:endParaRPr lang="de-DE" dirty="0"/>
+                    </a:p>
+                  </a:txBody>
+                  <a:tcPr/>
+                </a:tc>
+                <a:tc>
+                  <a:txBody>
+                    <a:bodyPr/>
+                    <a:lstStyle/>
+                    <a:p>
+                      <a:endParaRPr lang="de-DE" dirty="0"/>
+                    </a:p>
+                  </a:txBody>
+                  <a:tcPr/>
+                </a:tc>
+              </a:tr>
+              <a:tr h="370840">
+                <a:tc>
+                  <a:txBody>
+                    <a:bodyPr/>
+                    <a:lstStyle/>
+                    <a:p>
+                      <a:r>
+                        <a:rPr lang="de-DE" dirty="0" smtClean="0"/>
+                        <a:t>Risiken</a:t>
+                      </a:r>
+                      <a:endParaRPr lang="de-DE" dirty="0"/>
+                    </a:p>
+                  </a:txBody>
+                  <a:tcPr/>
+                </a:tc>
+                <a:tc>
+                  <a:txBody>
+                    <a:bodyPr/>
+                    <a:lstStyle/>
+                    <a:p>
+                      <a:endParaRPr lang="de-DE" dirty="0"/>
+                    </a:p>
+                  </a:txBody>
+                  <a:tcPr/>
+                </a:tc>
+              </a:tr>
+              <a:tr h="370840">
+                <a:tc>
+                  <a:txBody>
+                    <a:bodyPr/>
+                    <a:lstStyle/>
+                    <a:p>
+                      <a:r>
+                        <a:rPr lang="de-DE" dirty="0" smtClean="0"/>
+                        <a:t>Abweichungen</a:t>
+                      </a:r>
+                      <a:endParaRPr lang="de-DE" dirty="0"/>
+                    </a:p>
+                  </a:txBody>
+                  <a:tcPr/>
+                </a:tc>
+                <a:tc>
+                  <a:txBody>
+                    <a:bodyPr/>
+                    <a:lstStyle/>
+                    <a:p>
+                      <a:endParaRPr lang="de-DE" dirty="0"/>
+                    </a:p>
+                  </a:txBody>
+                  <a:tcPr/>
+                </a:tc>
+              </a:tr>
+            </a:tbl>
+          </a:graphicData>
+        </a:graphic>
+      </p:graphicFrame>
     </p:spTree>
   </p:cSld>
   <p:clrMapOvr>
@@ -3420,57 +5106,100 @@
           </a:p>
         </p:txBody>
       </p:sp>
-      <p:pic>
-        <p:nvPicPr>
-          <p:cNvPr id="1026" name="Picture 2" descr="D:\Documents\Dropbox\E-Health SS19\Bilder\Mockups\01_Login.png"/>
-          <p:cNvPicPr>
-            <a:picLocks noChangeAspect="1" noChangeArrowheads="1"/>
-          </p:cNvPicPr>
-          <p:nvPr/>
-        </p:nvPicPr>
-        <p:blipFill>
-          <a:blip r:embed="rId2" cstate="print"/>
-          <a:srcRect/>
-          <a:stretch>
-            <a:fillRect/>
-          </a:stretch>
-        </p:blipFill>
-        <p:spPr bwMode="auto">
-          <a:xfrm>
-            <a:off x="428596" y="1857364"/>
-            <a:ext cx="3725702" cy="2786082"/>
-          </a:xfrm>
-          <a:prstGeom prst="rect">
-            <a:avLst/>
-          </a:prstGeom>
-          <a:noFill/>
-        </p:spPr>
-      </p:pic>
-      <p:sp>
-        <p:nvSpPr>
-          <p:cNvPr id="5" name="TextBox 4"/>
-          <p:cNvSpPr txBox="1"/>
-          <p:nvPr/>
+      <p:sp>
+        <p:nvSpPr>
+          <p:cNvPr id="3" name="Content Placeholder 2"/>
+          <p:cNvSpPr>
+            <a:spLocks noGrp="1"/>
+          </p:cNvSpPr>
+          <p:nvPr>
+            <p:ph idx="1"/>
+          </p:nvPr>
         </p:nvSpPr>
         <p:spPr>
           <a:xfrm>
-            <a:off x="1285852" y="4786322"/>
-            <a:ext cx="1565108" cy="369332"/>
-          </a:xfrm>
-          <a:prstGeom prst="rect">
-            <a:avLst/>
-          </a:prstGeom>
-          <a:noFill/>
-        </p:spPr>
-        <p:txBody>
-          <a:bodyPr wrap="none" rtlCol="0">
-            <a:spAutoFit/>
-          </a:bodyPr>
-          <a:lstStyle/>
-          <a:p>
+            <a:off x="457200" y="1600201"/>
+            <a:ext cx="8229600" cy="3114684"/>
+          </a:xfrm>
+        </p:spPr>
+        <p:txBody>
+          <a:bodyPr/>
+          <a:lstStyle/>
+          <a:p>
+            <a:pPr algn="ctr">
+              <a:buNone/>
+            </a:pPr>
             <a:r>
               <a:rPr lang="de-DE" dirty="0" smtClean="0"/>
-              <a:t>Mockup: Login</a:t>
+              <a:t>„Eine </a:t>
+            </a:r>
+            <a:r>
+              <a:rPr lang="de-DE" b="1" dirty="0" smtClean="0"/>
+              <a:t>Webseite</a:t>
+            </a:r>
+            <a:r>
+              <a:rPr lang="de-DE" dirty="0" smtClean="0"/>
+              <a:t> für </a:t>
+            </a:r>
+            <a:r>
+              <a:rPr lang="de-DE" b="1" dirty="0" smtClean="0"/>
+              <a:t>Psychologen</a:t>
+            </a:r>
+            <a:r>
+              <a:rPr lang="de-DE" dirty="0" smtClean="0"/>
+              <a:t> und </a:t>
+            </a:r>
+            <a:r>
+              <a:rPr lang="de-DE" b="1" dirty="0" smtClean="0"/>
+              <a:t>Patienten </a:t>
+            </a:r>
+          </a:p>
+          <a:p>
+            <a:pPr algn="ctr">
+              <a:buNone/>
+            </a:pPr>
+            <a:r>
+              <a:rPr lang="de-DE" dirty="0" smtClean="0"/>
+              <a:t>entwickeln. Mit dem Ziel, dass Patienten ihre </a:t>
+            </a:r>
+          </a:p>
+          <a:p>
+            <a:pPr algn="ctr">
+              <a:buNone/>
+            </a:pPr>
+            <a:r>
+              <a:rPr lang="de-DE" b="1" dirty="0" smtClean="0"/>
+              <a:t>Stimmung</a:t>
+            </a:r>
+            <a:r>
+              <a:rPr lang="de-DE" dirty="0" smtClean="0"/>
+              <a:t> täglich digital aufzeichnen können </a:t>
+            </a:r>
+          </a:p>
+          <a:p>
+            <a:pPr algn="ctr">
+              <a:buNone/>
+            </a:pPr>
+            <a:r>
+              <a:rPr lang="de-DE" dirty="0" smtClean="0"/>
+              <a:t>und der Psychologe die </a:t>
+            </a:r>
+            <a:r>
+              <a:rPr lang="de-DE" b="1" dirty="0" smtClean="0"/>
+              <a:t>Ergbenisse</a:t>
+            </a:r>
+            <a:r>
+              <a:rPr lang="de-DE" dirty="0" smtClean="0"/>
+              <a:t> online </a:t>
+            </a:r>
+          </a:p>
+          <a:p>
+            <a:pPr algn="ctr">
+              <a:buNone/>
+            </a:pPr>
+            <a:r>
+              <a:rPr lang="de-DE" dirty="0" smtClean="0"/>
+              <a:t>einsehen kann.“</a:t>
             </a:r>
             <a:endParaRPr lang="de-DE" dirty="0"/>
           </a:p>
@@ -3518,37 +5247,7 @@
           <a:p>
             <a:r>
               <a:rPr lang="de-DE" dirty="0" smtClean="0"/>
-              <a:t>Projektidee</a:t>
-            </a:r>
-            <a:endParaRPr lang="de-DE" dirty="0"/>
-          </a:p>
-        </p:txBody>
-      </p:sp>
-      <p:sp>
-        <p:nvSpPr>
-          <p:cNvPr id="5" name="TextBox 4"/>
-          <p:cNvSpPr txBox="1"/>
-          <p:nvPr/>
-        </p:nvSpPr>
-        <p:spPr>
-          <a:xfrm>
-            <a:off x="1285852" y="4786322"/>
-            <a:ext cx="3050772" cy="369332"/>
-          </a:xfrm>
-          <a:prstGeom prst="rect">
-            <a:avLst/>
-          </a:prstGeom>
-          <a:noFill/>
-        </p:spPr>
-        <p:txBody>
-          <a:bodyPr wrap="none" rtlCol="0">
-            <a:spAutoFit/>
-          </a:bodyPr>
-          <a:lstStyle/>
-          <a:p>
-            <a:r>
-              <a:rPr lang="de-DE" dirty="0" smtClean="0"/>
-              <a:t>Mockup: Startseite Psychologe</a:t>
+              <a:t>Ergebnisse</a:t>
             </a:r>
             <a:endParaRPr lang="de-DE" dirty="0"/>
           </a:p>
@@ -3556,7 +5255,7 @@
       </p:sp>
       <p:pic>
         <p:nvPicPr>
-          <p:cNvPr id="2050" name="Picture 2" descr="D:\Documents\Dropbox\E-Health SS19\Bilder\Mockups\02_Startseite_Psych.png"/>
+          <p:cNvPr id="1026" name="Picture 2" descr="D:\Documents\Dropbox\E-Health SS19\Bilder\Mockups\01_Login.png"/>
           <p:cNvPicPr>
             <a:picLocks noChangeAspect="1" noChangeArrowheads="1"/>
           </p:cNvPicPr>
@@ -3571,8 +5270,8 @@
         </p:blipFill>
         <p:spPr bwMode="auto">
           <a:xfrm>
-            <a:off x="357158" y="1714488"/>
-            <a:ext cx="3714776" cy="2786082"/>
+            <a:off x="428596" y="1857364"/>
+            <a:ext cx="3725702" cy="2786082"/>
           </a:xfrm>
           <a:prstGeom prst="rect">
             <a:avLst/>
@@ -3580,6 +5279,90 @@
           <a:noFill/>
         </p:spPr>
       </p:pic>
+      <p:sp>
+        <p:nvSpPr>
+          <p:cNvPr id="5" name="TextBox 4"/>
+          <p:cNvSpPr txBox="1"/>
+          <p:nvPr/>
+        </p:nvSpPr>
+        <p:spPr>
+          <a:xfrm>
+            <a:off x="1285852" y="4786322"/>
+            <a:ext cx="1565108" cy="369332"/>
+          </a:xfrm>
+          <a:prstGeom prst="rect">
+            <a:avLst/>
+          </a:prstGeom>
+          <a:noFill/>
+        </p:spPr>
+        <p:txBody>
+          <a:bodyPr wrap="none" rtlCol="0">
+            <a:spAutoFit/>
+          </a:bodyPr>
+          <a:lstStyle/>
+          <a:p>
+            <a:r>
+              <a:rPr lang="de-DE" dirty="0" smtClean="0"/>
+              <a:t>Mockup: Login</a:t>
+            </a:r>
+            <a:endParaRPr lang="de-DE" dirty="0"/>
+          </a:p>
+        </p:txBody>
+      </p:sp>
+      <p:pic>
+        <p:nvPicPr>
+          <p:cNvPr id="6" name="Picture 5" descr="login.PNG"/>
+          <p:cNvPicPr>
+            <a:picLocks noChangeAspect="1"/>
+          </p:cNvPicPr>
+          <p:nvPr/>
+        </p:nvPicPr>
+        <p:blipFill>
+          <a:blip r:embed="rId3" cstate="print"/>
+          <a:stretch>
+            <a:fillRect/>
+          </a:stretch>
+        </p:blipFill>
+        <p:spPr>
+          <a:xfrm>
+            <a:off x="4306048" y="1857364"/>
+            <a:ext cx="4799904" cy="2786082"/>
+          </a:xfrm>
+          <a:prstGeom prst="rect">
+            <a:avLst/>
+          </a:prstGeom>
+        </p:spPr>
+      </p:pic>
+      <p:sp>
+        <p:nvSpPr>
+          <p:cNvPr id="7" name="TextBox 6"/>
+          <p:cNvSpPr txBox="1"/>
+          <p:nvPr/>
+        </p:nvSpPr>
+        <p:spPr>
+          <a:xfrm>
+            <a:off x="5610948" y="4857760"/>
+            <a:ext cx="2241832" cy="369332"/>
+          </a:xfrm>
+          <a:prstGeom prst="rect">
+            <a:avLst/>
+          </a:prstGeom>
+          <a:noFill/>
+        </p:spPr>
+        <p:txBody>
+          <a:bodyPr wrap="none" rtlCol="0">
+            <a:spAutoFit/>
+          </a:bodyPr>
+          <a:lstStyle/>
+          <a:p>
+            <a:r>
+              <a:rPr lang="de-DE" dirty="0" smtClean="0"/>
+              <a:t>Umgesetztes Ergebnis</a:t>
+            </a:r>
+            <a:endParaRPr lang="de-DE" dirty="0"/>
+          </a:p>
+        </p:txBody>
+      </p:sp>
     </p:spTree>
   </p:cSld>
   <p:clrMapOvr>
@@ -3622,7 +5405,7 @@
           <a:p>
             <a:r>
               <a:rPr lang="de-DE" dirty="0" smtClean="0"/>
-              <a:t>Projektidee</a:t>
+              <a:t>Ergebnisse</a:t>
             </a:r>
             <a:endParaRPr lang="de-DE" dirty="0"/>
           </a:p>
@@ -3636,8 +5419,8 @@
         </p:nvSpPr>
         <p:spPr>
           <a:xfrm>
-            <a:off x="1071538" y="4643446"/>
-            <a:ext cx="2526589" cy="369332"/>
+            <a:off x="285720" y="4643446"/>
+            <a:ext cx="3050772" cy="369332"/>
           </a:xfrm>
           <a:prstGeom prst="rect">
             <a:avLst/>
@@ -3652,7 +5435,7 @@
           <a:p>
             <a:r>
               <a:rPr lang="de-DE" dirty="0" smtClean="0"/>
-              <a:t>Mockup: Dropdown links</a:t>
+              <a:t>Mockup: Startseite Psychologe</a:t>
             </a:r>
             <a:endParaRPr lang="de-DE" dirty="0"/>
           </a:p>
@@ -3660,7 +5443,7 @@
       </p:sp>
       <p:pic>
         <p:nvPicPr>
-          <p:cNvPr id="3074" name="Picture 2" descr="D:\Documents\Dropbox\E-Health SS19\Bilder\Mockups\03_dropdown_psych.png"/>
+          <p:cNvPr id="2050" name="Picture 2" descr="D:\Documents\Dropbox\E-Health SS19\Bilder\Mockups\02_Startseite_Psych.png"/>
           <p:cNvPicPr>
             <a:picLocks noChangeAspect="1" noChangeArrowheads="1"/>
           </p:cNvPicPr>
@@ -3675,8 +5458,8 @@
         </p:blipFill>
         <p:spPr bwMode="auto">
           <a:xfrm>
-            <a:off x="642910" y="1785926"/>
-            <a:ext cx="3827504" cy="2857520"/>
+            <a:off x="142844" y="1714488"/>
+            <a:ext cx="3714776" cy="2786082"/>
           </a:xfrm>
           <a:prstGeom prst="rect">
             <a:avLst/>
@@ -3684,6 +5467,64 @@
           <a:noFill/>
         </p:spPr>
       </p:pic>
+      <p:pic>
+        <p:nvPicPr>
+          <p:cNvPr id="6" name="Picture 5" descr="startseite.PNG"/>
+          <p:cNvPicPr>
+            <a:picLocks noChangeAspect="1"/>
+          </p:cNvPicPr>
+          <p:nvPr/>
+        </p:nvPicPr>
+        <p:blipFill>
+          <a:blip r:embed="rId3" cstate="print"/>
+          <a:stretch>
+            <a:fillRect/>
+          </a:stretch>
+        </p:blipFill>
+        <p:spPr>
+          <a:xfrm>
+            <a:off x="4000496" y="1785926"/>
+            <a:ext cx="5282652" cy="1928826"/>
+          </a:xfrm>
+          <a:prstGeom prst="rect">
+            <a:avLst/>
+          </a:prstGeom>
+        </p:spPr>
+      </p:pic>
+      <p:sp>
+        <p:nvSpPr>
+          <p:cNvPr id="7" name="TextBox 6"/>
+          <p:cNvSpPr txBox="1"/>
+          <p:nvPr/>
+        </p:nvSpPr>
+        <p:spPr>
+          <a:xfrm>
+            <a:off x="5279406" y="4714884"/>
+            <a:ext cx="2241832" cy="369332"/>
+          </a:xfrm>
+          <a:prstGeom prst="rect">
+            <a:avLst/>
+          </a:prstGeom>
+          <a:noFill/>
+        </p:spPr>
+        <p:txBody>
+          <a:bodyPr wrap="none" rtlCol="0">
+            <a:spAutoFit/>
+          </a:bodyPr>
+          <a:lstStyle/>
+          <a:p>
+            <a:r>
+              <a:rPr lang="de-DE" dirty="0" smtClean="0"/>
+              <a:t>Umgesetztes </a:t>
+            </a:r>
+            <a:r>
+              <a:rPr lang="de-DE" dirty="0" smtClean="0"/>
+              <a:t>Ergebnis</a:t>
+            </a:r>
+            <a:endParaRPr lang="de-DE" dirty="0"/>
+          </a:p>
+        </p:txBody>
+      </p:sp>
     </p:spTree>
   </p:cSld>
   <p:clrMapOvr>
@@ -3726,7 +5567,7 @@
           <a:p>
             <a:r>
               <a:rPr lang="de-DE" dirty="0" smtClean="0"/>
-              <a:t>Projektidee</a:t>
+              <a:t>Ergebnisse</a:t>
             </a:r>
             <a:endParaRPr lang="de-DE" dirty="0"/>
           </a:p>
@@ -3740,7 +5581,7 @@
         </p:nvSpPr>
         <p:spPr>
           <a:xfrm>
-            <a:off x="1285852" y="4643446"/>
+            <a:off x="3714744" y="1428736"/>
             <a:ext cx="2523832" cy="369332"/>
           </a:xfrm>
           <a:prstGeom prst="rect">
@@ -3779,8 +5620,8 @@
         </p:blipFill>
         <p:spPr bwMode="auto">
           <a:xfrm>
-            <a:off x="571472" y="1571612"/>
-            <a:ext cx="4094442" cy="3071834"/>
+            <a:off x="142844" y="1428736"/>
+            <a:ext cx="3571900" cy="2679800"/>
           </a:xfrm>
           <a:prstGeom prst="rect">
             <a:avLst/>
@@ -3788,6 +5629,64 @@
           <a:noFill/>
         </p:spPr>
       </p:pic>
+      <p:pic>
+        <p:nvPicPr>
+          <p:cNvPr id="6" name="Picture 5" descr="anlegen.PNG"/>
+          <p:cNvPicPr>
+            <a:picLocks noChangeAspect="1"/>
+          </p:cNvPicPr>
+          <p:nvPr/>
+        </p:nvPicPr>
+        <p:blipFill>
+          <a:blip r:embed="rId3" cstate="print"/>
+          <a:stretch>
+            <a:fillRect/>
+          </a:stretch>
+        </p:blipFill>
+        <p:spPr>
+          <a:xfrm>
+            <a:off x="3077451" y="4214818"/>
+            <a:ext cx="5872516" cy="2571768"/>
+          </a:xfrm>
+          <a:prstGeom prst="rect">
+            <a:avLst/>
+          </a:prstGeom>
+        </p:spPr>
+      </p:pic>
+      <p:sp>
+        <p:nvSpPr>
+          <p:cNvPr id="7" name="TextBox 6"/>
+          <p:cNvSpPr txBox="1"/>
+          <p:nvPr/>
+        </p:nvSpPr>
+        <p:spPr>
+          <a:xfrm>
+            <a:off x="142844" y="6357958"/>
+            <a:ext cx="2241832" cy="369332"/>
+          </a:xfrm>
+          <a:prstGeom prst="rect">
+            <a:avLst/>
+          </a:prstGeom>
+          <a:noFill/>
+        </p:spPr>
+        <p:txBody>
+          <a:bodyPr wrap="none" rtlCol="0">
+            <a:spAutoFit/>
+          </a:bodyPr>
+          <a:lstStyle/>
+          <a:p>
+            <a:r>
+              <a:rPr lang="de-DE" dirty="0" smtClean="0"/>
+              <a:t>Umgesetztes </a:t>
+            </a:r>
+            <a:r>
+              <a:rPr lang="de-DE" dirty="0" smtClean="0"/>
+              <a:t>Ergebnis</a:t>
+            </a:r>
+            <a:endParaRPr lang="de-DE" dirty="0"/>
+          </a:p>
+        </p:txBody>
+      </p:sp>
     </p:spTree>
   </p:cSld>
   <p:clrMapOvr>
@@ -3830,7 +5729,7 @@
           <a:p>
             <a:r>
               <a:rPr lang="de-DE" dirty="0" smtClean="0"/>
-              <a:t>Projektidee</a:t>
+              <a:t>Ergebnisse</a:t>
             </a:r>
             <a:endParaRPr lang="de-DE" dirty="0"/>
           </a:p>
@@ -3844,8 +5743,8 @@
         </p:nvSpPr>
         <p:spPr>
           <a:xfrm>
-            <a:off x="1285852" y="4643446"/>
-            <a:ext cx="2523832" cy="369332"/>
+            <a:off x="642910" y="4643446"/>
+            <a:ext cx="2507225" cy="369332"/>
           </a:xfrm>
           <a:prstGeom prst="rect">
             <a:avLst/>
@@ -3860,7 +5759,7 @@
           <a:p>
             <a:r>
               <a:rPr lang="de-DE" dirty="0" smtClean="0"/>
-              <a:t>Mockup: Patient anlegen</a:t>
+              <a:t>Mockup: Patientensuche</a:t>
             </a:r>
             <a:endParaRPr lang="de-DE" dirty="0"/>
           </a:p>
@@ -3868,7 +5767,7 @@
       </p:sp>
       <p:pic>
         <p:nvPicPr>
-          <p:cNvPr id="5122" name="Picture 2" descr="D:\Documents\Dropbox\E-Health SS19\Bilder\Mockups\05_Patientensuche.png"/>
+          <p:cNvPr id="1026" name="Picture 2" descr="D:\Documents\Dropbox\E-Health SS19\Bilder\Mockups\05_Patientensuche.png"/>
           <p:cNvPicPr>
             <a:picLocks noChangeAspect="1" noChangeArrowheads="1"/>
           </p:cNvPicPr>
@@ -3883,8 +5782,8 @@
         </p:blipFill>
         <p:spPr bwMode="auto">
           <a:xfrm>
-            <a:off x="714347" y="1714488"/>
-            <a:ext cx="3898913" cy="2928958"/>
+            <a:off x="214282" y="1714488"/>
+            <a:ext cx="3786182" cy="2844273"/>
           </a:xfrm>
           <a:prstGeom prst="rect">
             <a:avLst/>
@@ -3892,6 +5791,330 @@
           <a:noFill/>
         </p:spPr>
       </p:pic>
+      <p:pic>
+        <p:nvPicPr>
+          <p:cNvPr id="6" name="Picture 5" descr="suche.PNG"/>
+          <p:cNvPicPr>
+            <a:picLocks noChangeAspect="1"/>
+          </p:cNvPicPr>
+          <p:nvPr/>
+        </p:nvPicPr>
+        <p:blipFill>
+          <a:blip r:embed="rId3" cstate="print"/>
+          <a:stretch>
+            <a:fillRect/>
+          </a:stretch>
+        </p:blipFill>
+        <p:spPr>
+          <a:xfrm>
+            <a:off x="4143372" y="1785926"/>
+            <a:ext cx="4849124" cy="2500330"/>
+          </a:xfrm>
+          <a:prstGeom prst="rect">
+            <a:avLst/>
+          </a:prstGeom>
+        </p:spPr>
+      </p:pic>
+      <p:sp>
+        <p:nvSpPr>
+          <p:cNvPr id="7" name="TextBox 6"/>
+          <p:cNvSpPr txBox="1"/>
+          <p:nvPr/>
+        </p:nvSpPr>
+        <p:spPr>
+          <a:xfrm>
+            <a:off x="5286380" y="4572008"/>
+            <a:ext cx="2241832" cy="369332"/>
+          </a:xfrm>
+          <a:prstGeom prst="rect">
+            <a:avLst/>
+          </a:prstGeom>
+          <a:noFill/>
+        </p:spPr>
+        <p:txBody>
+          <a:bodyPr wrap="none" rtlCol="0">
+            <a:spAutoFit/>
+          </a:bodyPr>
+          <a:lstStyle/>
+          <a:p>
+            <a:r>
+              <a:rPr lang="de-DE" dirty="0" smtClean="0"/>
+              <a:t>Umgesetztes </a:t>
+            </a:r>
+            <a:r>
+              <a:rPr lang="de-DE" dirty="0" smtClean="0"/>
+              <a:t>Ergebnis</a:t>
+            </a:r>
+            <a:endParaRPr lang="de-DE" dirty="0"/>
+          </a:p>
+        </p:txBody>
+      </p:sp>
+    </p:spTree>
+  </p:cSld>
+  <p:clrMapOvr>
+    <a:masterClrMapping/>
+  </p:clrMapOvr>
+</p:sld>
+</file>
+
+<file path=ppt/slides/slide8.xml><?xml version="1.0" encoding="utf-8"?>
+<p:sld xmlns:a="http://schemas.openxmlformats.org/drawingml/2006/main" xmlns:r="http://schemas.openxmlformats.org/officeDocument/2006/relationships" xmlns:p="http://schemas.openxmlformats.org/presentationml/2006/main">
+  <p:cSld>
+    <p:spTree>
+      <p:nvGrpSpPr>
+        <p:cNvPr id="1" name=""/>
+        <p:cNvGrpSpPr/>
+        <p:nvPr/>
+      </p:nvGrpSpPr>
+      <p:grpSpPr>
+        <a:xfrm>
+          <a:off x="0" y="0"/>
+          <a:ext cx="0" cy="0"/>
+          <a:chOff x="0" y="0"/>
+          <a:chExt cx="0" cy="0"/>
+        </a:xfrm>
+      </p:grpSpPr>
+      <p:sp>
+        <p:nvSpPr>
+          <p:cNvPr id="2" name="Title 1"/>
+          <p:cNvSpPr>
+            <a:spLocks noGrp="1"/>
+          </p:cNvSpPr>
+          <p:nvPr>
+            <p:ph type="title"/>
+          </p:nvPr>
+        </p:nvSpPr>
+        <p:spPr/>
+        <p:txBody>
+          <a:bodyPr/>
+          <a:lstStyle/>
+          <a:p>
+            <a:r>
+              <a:rPr lang="de-DE" dirty="0" smtClean="0"/>
+              <a:t>Ergebnisse</a:t>
+            </a:r>
+            <a:endParaRPr lang="de-DE" dirty="0"/>
+          </a:p>
+        </p:txBody>
+      </p:sp>
+      <p:sp>
+        <p:nvSpPr>
+          <p:cNvPr id="5" name="TextBox 4"/>
+          <p:cNvSpPr txBox="1"/>
+          <p:nvPr/>
+        </p:nvSpPr>
+        <p:spPr>
+          <a:xfrm>
+            <a:off x="1500166" y="4643446"/>
+            <a:ext cx="2343462" cy="369332"/>
+          </a:xfrm>
+          <a:prstGeom prst="rect">
+            <a:avLst/>
+          </a:prstGeom>
+          <a:noFill/>
+        </p:spPr>
+        <p:txBody>
+          <a:bodyPr wrap="none" rtlCol="0">
+            <a:spAutoFit/>
+          </a:bodyPr>
+          <a:lstStyle/>
+          <a:p>
+            <a:r>
+              <a:rPr lang="de-DE" dirty="0" smtClean="0"/>
+              <a:t>Mockup: Patientenliste</a:t>
+            </a:r>
+            <a:endParaRPr lang="de-DE" dirty="0"/>
+          </a:p>
+        </p:txBody>
+      </p:sp>
+      <p:pic>
+        <p:nvPicPr>
+          <p:cNvPr id="2050" name="Picture 2" descr="D:\Documents\Dropbox\E-Health SS19\Bilder\Mockups\06_Liste_gesuchter_patienten.png"/>
+          <p:cNvPicPr>
+            <a:picLocks noChangeAspect="1" noChangeArrowheads="1"/>
+          </p:cNvPicPr>
+          <p:nvPr/>
+        </p:nvPicPr>
+        <p:blipFill>
+          <a:blip r:embed="rId2" cstate="print"/>
+          <a:srcRect/>
+          <a:stretch>
+            <a:fillRect/>
+          </a:stretch>
+        </p:blipFill>
+        <p:spPr bwMode="auto">
+          <a:xfrm>
+            <a:off x="1000100" y="1857364"/>
+            <a:ext cx="3711134" cy="2786082"/>
+          </a:xfrm>
+          <a:prstGeom prst="rect">
+            <a:avLst/>
+          </a:prstGeom>
+          <a:noFill/>
+        </p:spPr>
+      </p:pic>
+    </p:spTree>
+  </p:cSld>
+  <p:clrMapOvr>
+    <a:masterClrMapping/>
+  </p:clrMapOvr>
+</p:sld>
+</file>
+
+<file path=ppt/slides/slide9.xml><?xml version="1.0" encoding="utf-8"?>
+<p:sld xmlns:a="http://schemas.openxmlformats.org/drawingml/2006/main" xmlns:r="http://schemas.openxmlformats.org/officeDocument/2006/relationships" xmlns:p="http://schemas.openxmlformats.org/presentationml/2006/main">
+  <p:cSld>
+    <p:spTree>
+      <p:nvGrpSpPr>
+        <p:cNvPr id="1" name=""/>
+        <p:cNvGrpSpPr/>
+        <p:nvPr/>
+      </p:nvGrpSpPr>
+      <p:grpSpPr>
+        <a:xfrm>
+          <a:off x="0" y="0"/>
+          <a:ext cx="0" cy="0"/>
+          <a:chOff x="0" y="0"/>
+          <a:chExt cx="0" cy="0"/>
+        </a:xfrm>
+      </p:grpSpPr>
+      <p:sp>
+        <p:nvSpPr>
+          <p:cNvPr id="2" name="Title 1"/>
+          <p:cNvSpPr>
+            <a:spLocks noGrp="1"/>
+          </p:cNvSpPr>
+          <p:nvPr>
+            <p:ph type="title"/>
+          </p:nvPr>
+        </p:nvSpPr>
+        <p:spPr/>
+        <p:txBody>
+          <a:bodyPr/>
+          <a:lstStyle/>
+          <a:p>
+            <a:r>
+              <a:rPr lang="de-DE" dirty="0" smtClean="0"/>
+              <a:t>Ergebnisse</a:t>
+            </a:r>
+            <a:endParaRPr lang="de-DE" dirty="0"/>
+          </a:p>
+        </p:txBody>
+      </p:sp>
+      <p:sp>
+        <p:nvSpPr>
+          <p:cNvPr id="5" name="TextBox 4"/>
+          <p:cNvSpPr txBox="1"/>
+          <p:nvPr/>
+        </p:nvSpPr>
+        <p:spPr>
+          <a:xfrm>
+            <a:off x="3929058" y="1428736"/>
+            <a:ext cx="2868157" cy="369332"/>
+          </a:xfrm>
+          <a:prstGeom prst="rect">
+            <a:avLst/>
+          </a:prstGeom>
+          <a:noFill/>
+        </p:spPr>
+        <p:txBody>
+          <a:bodyPr wrap="none" rtlCol="0">
+            <a:spAutoFit/>
+          </a:bodyPr>
+          <a:lstStyle/>
+          <a:p>
+            <a:r>
+              <a:rPr lang="de-DE" dirty="0" smtClean="0"/>
+              <a:t>Mockup: Statistik Tagebuch </a:t>
+            </a:r>
+            <a:endParaRPr lang="de-DE" dirty="0"/>
+          </a:p>
+        </p:txBody>
+      </p:sp>
+      <p:pic>
+        <p:nvPicPr>
+          <p:cNvPr id="3074" name="Picture 2" descr="D:\Documents\Dropbox\E-Health SS19\Bilder\Mockups\07_Diagramm.png"/>
+          <p:cNvPicPr>
+            <a:picLocks noChangeAspect="1" noChangeArrowheads="1"/>
+          </p:cNvPicPr>
+          <p:nvPr/>
+        </p:nvPicPr>
+        <p:blipFill>
+          <a:blip r:embed="rId2" cstate="print"/>
+          <a:srcRect/>
+          <a:stretch>
+            <a:fillRect/>
+          </a:stretch>
+        </p:blipFill>
+        <p:spPr bwMode="auto">
+          <a:xfrm>
+            <a:off x="142844" y="1428736"/>
+            <a:ext cx="3786213" cy="2831333"/>
+          </a:xfrm>
+          <a:prstGeom prst="rect">
+            <a:avLst/>
+          </a:prstGeom>
+          <a:noFill/>
+        </p:spPr>
+      </p:pic>
+      <p:pic>
+        <p:nvPicPr>
+          <p:cNvPr id="6" name="Picture 5" descr="diagramm.PNG"/>
+          <p:cNvPicPr>
+            <a:picLocks noChangeAspect="1"/>
+          </p:cNvPicPr>
+          <p:nvPr/>
+        </p:nvPicPr>
+        <p:blipFill>
+          <a:blip r:embed="rId3" cstate="print"/>
+          <a:stretch>
+            <a:fillRect/>
+          </a:stretch>
+        </p:blipFill>
+        <p:spPr>
+          <a:xfrm>
+            <a:off x="3487938" y="3857628"/>
+            <a:ext cx="5656062" cy="2921217"/>
+          </a:xfrm>
+          <a:prstGeom prst="rect">
+            <a:avLst/>
+          </a:prstGeom>
+        </p:spPr>
+      </p:pic>
+      <p:sp>
+        <p:nvSpPr>
+          <p:cNvPr id="7" name="TextBox 6"/>
+          <p:cNvSpPr txBox="1"/>
+          <p:nvPr/>
+        </p:nvSpPr>
+        <p:spPr>
+          <a:xfrm>
+            <a:off x="500034" y="6357958"/>
+            <a:ext cx="2241832" cy="369332"/>
+          </a:xfrm>
+          <a:prstGeom prst="rect">
+            <a:avLst/>
+          </a:prstGeom>
+          <a:noFill/>
+        </p:spPr>
+        <p:txBody>
+          <a:bodyPr wrap="none" rtlCol="0">
+            <a:spAutoFit/>
+          </a:bodyPr>
+          <a:lstStyle/>
+          <a:p>
+            <a:r>
+              <a:rPr lang="de-DE" dirty="0" smtClean="0"/>
+              <a:t>Umgesetztes </a:t>
+            </a:r>
+            <a:r>
+              <a:rPr lang="de-DE" dirty="0" smtClean="0"/>
+              <a:t>Ergebnis</a:t>
+            </a:r>
+            <a:endParaRPr lang="de-DE" dirty="0"/>
+          </a:p>
+        </p:txBody>
+      </p:sp>
     </p:spTree>
   </p:cSld>
   <p:clrMapOvr>

</xml_diff>